<commit_message>
Cleaned out the notebook, presentable
</commit_message>
<xml_diff>
--- a/ArtClassification.pptx
+++ b/ArtClassification.pptx
@@ -5,7 +5,7 @@
     <p:sldMasterId id="2147483660" r:id="rId1"/>
   </p:sldMasterIdLst>
   <p:notesMasterIdLst>
-    <p:notesMasterId r:id="rId23"/>
+    <p:notesMasterId r:id="rId24"/>
   </p:notesMasterIdLst>
   <p:sldIdLst>
     <p:sldId id="256" r:id="rId2"/>
@@ -29,6 +29,7 @@
     <p:sldId id="274" r:id="rId20"/>
     <p:sldId id="275" r:id="rId21"/>
     <p:sldId id="277" r:id="rId22"/>
+    <p:sldId id="282" r:id="rId23"/>
   </p:sldIdLst>
   <p:sldSz cx="12192000" cy="6858000"/>
   <p:notesSz cx="6858000" cy="9144000"/>
@@ -127,7 +128,578 @@
       </a:defRPr>
     </a:lvl9pPr>
   </p:defaultTextStyle>
+  <p:extLst>
+    <p:ext uri="{EFAFB233-063F-42B5-8137-9DF3F51BA10A}">
+      <p15:sldGuideLst xmlns:p15="http://schemas.microsoft.com/office/powerpoint/2012/main"/>
+    </p:ext>
+  </p:extLst>
 </p:presentation>
+</file>
+
+<file path=ppt/revisionInfo.xml><?xml version="1.0" encoding="utf-8"?>
+<p1510:revInfo xmlns:a="http://schemas.openxmlformats.org/drawingml/2006/main" xmlns:r="http://schemas.openxmlformats.org/officeDocument/2006/relationships" xmlns:p1510="http://schemas.microsoft.com/office/powerpoint/2015/10/main">
+  <p1510:revLst>
+    <p1510:client id="{53929D23-E160-450C-BFB9-5CA732686B3E}" v="14" dt="2020-04-30T18:56:48.349"/>
+  </p1510:revLst>
+</p1510:revInfo>
+</file>
+
+<file path=ppt/changesInfos/changesInfo1.xml><?xml version="1.0" encoding="utf-8"?>
+<pc:chgInfo xmlns:a="http://schemas.openxmlformats.org/drawingml/2006/main" xmlns:r="http://schemas.openxmlformats.org/officeDocument/2006/relationships" xmlns:ac="http://schemas.microsoft.com/office/drawing/2013/main/command" xmlns:pc="http://schemas.microsoft.com/office/powerpoint/2013/main/command">
+  <pc:docChgLst>
+    <pc:chgData name="José Guzmán" userId="cdde4e38-05f8-4ad3-adcb-d5cbeb26b993" providerId="ADAL" clId="{53929D23-E160-450C-BFB9-5CA732686B3E}"/>
+    <pc:docChg chg="undo custSel mod addSld modSld">
+      <pc:chgData name="José Guzmán" userId="cdde4e38-05f8-4ad3-adcb-d5cbeb26b993" providerId="ADAL" clId="{53929D23-E160-450C-BFB9-5CA732686B3E}" dt="2020-04-30T19:09:30.117" v="1764" actId="1076"/>
+      <pc:docMkLst>
+        <pc:docMk/>
+      </pc:docMkLst>
+      <pc:sldChg chg="addSp modSp mod setBg">
+        <pc:chgData name="José Guzmán" userId="cdde4e38-05f8-4ad3-adcb-d5cbeb26b993" providerId="ADAL" clId="{53929D23-E160-450C-BFB9-5CA732686B3E}" dt="2020-04-30T18:15:40.399" v="50" actId="14100"/>
+        <pc:sldMkLst>
+          <pc:docMk/>
+          <pc:sldMk cId="3032115153" sldId="257"/>
+        </pc:sldMkLst>
+        <pc:spChg chg="mod">
+          <ac:chgData name="José Guzmán" userId="cdde4e38-05f8-4ad3-adcb-d5cbeb26b993" providerId="ADAL" clId="{53929D23-E160-450C-BFB9-5CA732686B3E}" dt="2020-04-30T18:14:41.630" v="28" actId="14100"/>
+          <ac:spMkLst>
+            <pc:docMk/>
+            <pc:sldMk cId="3032115153" sldId="257"/>
+            <ac:spMk id="2" creationId="{3A5AD8E6-404E-4BAD-8A79-75ADF6D2CDA8}"/>
+          </ac:spMkLst>
+        </pc:spChg>
+        <pc:spChg chg="mod">
+          <ac:chgData name="José Guzmán" userId="cdde4e38-05f8-4ad3-adcb-d5cbeb26b993" providerId="ADAL" clId="{53929D23-E160-450C-BFB9-5CA732686B3E}" dt="2020-04-30T18:15:40.399" v="50" actId="14100"/>
+          <ac:spMkLst>
+            <pc:docMk/>
+            <pc:sldMk cId="3032115153" sldId="257"/>
+            <ac:spMk id="3" creationId="{3D006B77-682A-41C6-AD82-D3E85D547DEF}"/>
+          </ac:spMkLst>
+        </pc:spChg>
+        <pc:picChg chg="add mod">
+          <ac:chgData name="José Guzmán" userId="cdde4e38-05f8-4ad3-adcb-d5cbeb26b993" providerId="ADAL" clId="{53929D23-E160-450C-BFB9-5CA732686B3E}" dt="2020-04-30T18:13:42.819" v="3" actId="26606"/>
+          <ac:picMkLst>
+            <pc:docMk/>
+            <pc:sldMk cId="3032115153" sldId="257"/>
+            <ac:picMk id="1026" creationId="{D7EFBF4E-AA49-4E01-A8D6-36EC62085693}"/>
+          </ac:picMkLst>
+        </pc:picChg>
+      </pc:sldChg>
+      <pc:sldChg chg="modSp mod">
+        <pc:chgData name="José Guzmán" userId="cdde4e38-05f8-4ad3-adcb-d5cbeb26b993" providerId="ADAL" clId="{53929D23-E160-450C-BFB9-5CA732686B3E}" dt="2020-04-30T18:15:01.059" v="36" actId="20577"/>
+        <pc:sldMkLst>
+          <pc:docMk/>
+          <pc:sldMk cId="4168175221" sldId="258"/>
+        </pc:sldMkLst>
+        <pc:spChg chg="mod">
+          <ac:chgData name="José Guzmán" userId="cdde4e38-05f8-4ad3-adcb-d5cbeb26b993" providerId="ADAL" clId="{53929D23-E160-450C-BFB9-5CA732686B3E}" dt="2020-04-30T18:14:32.223" v="27" actId="14100"/>
+          <ac:spMkLst>
+            <pc:docMk/>
+            <pc:sldMk cId="4168175221" sldId="258"/>
+            <ac:spMk id="2" creationId="{BE6D706E-D2B9-4075-ADC1-DD831FC5D500}"/>
+          </ac:spMkLst>
+        </pc:spChg>
+        <pc:spChg chg="mod">
+          <ac:chgData name="José Guzmán" userId="cdde4e38-05f8-4ad3-adcb-d5cbeb26b993" providerId="ADAL" clId="{53929D23-E160-450C-BFB9-5CA732686B3E}" dt="2020-04-30T18:15:01.059" v="36" actId="20577"/>
+          <ac:spMkLst>
+            <pc:docMk/>
+            <pc:sldMk cId="4168175221" sldId="258"/>
+            <ac:spMk id="3" creationId="{9C5CB065-6D1D-41AD-9276-B657393DE8C6}"/>
+          </ac:spMkLst>
+        </pc:spChg>
+      </pc:sldChg>
+      <pc:sldChg chg="addSp delSp modSp mod">
+        <pc:chgData name="José Guzmán" userId="cdde4e38-05f8-4ad3-adcb-d5cbeb26b993" providerId="ADAL" clId="{53929D23-E160-450C-BFB9-5CA732686B3E}" dt="2020-04-30T18:24:20.895" v="159" actId="313"/>
+        <pc:sldMkLst>
+          <pc:docMk/>
+          <pc:sldMk cId="777403929" sldId="259"/>
+        </pc:sldMkLst>
+        <pc:spChg chg="mod">
+          <ac:chgData name="José Guzmán" userId="cdde4e38-05f8-4ad3-adcb-d5cbeb26b993" providerId="ADAL" clId="{53929D23-E160-450C-BFB9-5CA732686B3E}" dt="2020-04-30T18:17:02.971" v="104" actId="20577"/>
+          <ac:spMkLst>
+            <pc:docMk/>
+            <pc:sldMk cId="777403929" sldId="259"/>
+            <ac:spMk id="3" creationId="{8AF4BC1C-796A-4E04-930B-E0A25368D012}"/>
+          </ac:spMkLst>
+        </pc:spChg>
+        <pc:spChg chg="mod">
+          <ac:chgData name="José Guzmán" userId="cdde4e38-05f8-4ad3-adcb-d5cbeb26b993" providerId="ADAL" clId="{53929D23-E160-450C-BFB9-5CA732686B3E}" dt="2020-04-30T18:24:20.895" v="159" actId="313"/>
+          <ac:spMkLst>
+            <pc:docMk/>
+            <pc:sldMk cId="777403929" sldId="259"/>
+            <ac:spMk id="4" creationId="{538BE4B0-35FD-47C8-84AD-F303B2BC511E}"/>
+          </ac:spMkLst>
+        </pc:spChg>
+        <pc:spChg chg="mod">
+          <ac:chgData name="José Guzmán" userId="cdde4e38-05f8-4ad3-adcb-d5cbeb26b993" providerId="ADAL" clId="{53929D23-E160-450C-BFB9-5CA732686B3E}" dt="2020-04-30T18:22:33.806" v="155" actId="1076"/>
+          <ac:spMkLst>
+            <pc:docMk/>
+            <pc:sldMk cId="777403929" sldId="259"/>
+            <ac:spMk id="5" creationId="{49BF1CE7-FC23-4738-95A5-86ABA433D6FF}"/>
+          </ac:spMkLst>
+        </pc:spChg>
+        <pc:spChg chg="mod">
+          <ac:chgData name="José Guzmán" userId="cdde4e38-05f8-4ad3-adcb-d5cbeb26b993" providerId="ADAL" clId="{53929D23-E160-450C-BFB9-5CA732686B3E}" dt="2020-04-30T18:22:33.806" v="155" actId="1076"/>
+          <ac:spMkLst>
+            <pc:docMk/>
+            <pc:sldMk cId="777403929" sldId="259"/>
+            <ac:spMk id="6" creationId="{B5F619DF-7F5F-4827-80BE-4E30839810B3}"/>
+          </ac:spMkLst>
+        </pc:spChg>
+        <pc:cxnChg chg="del mod">
+          <ac:chgData name="José Guzmán" userId="cdde4e38-05f8-4ad3-adcb-d5cbeb26b993" providerId="ADAL" clId="{53929D23-E160-450C-BFB9-5CA732686B3E}" dt="2020-04-30T18:19:26.749" v="124" actId="478"/>
+          <ac:cxnSpMkLst>
+            <pc:docMk/>
+            <pc:sldMk cId="777403929" sldId="259"/>
+            <ac:cxnSpMk id="9" creationId="{43A6DD7A-1132-42A5-9D79-B5409FDEC266}"/>
+          </ac:cxnSpMkLst>
+        </pc:cxnChg>
+        <pc:cxnChg chg="del mod">
+          <ac:chgData name="José Guzmán" userId="cdde4e38-05f8-4ad3-adcb-d5cbeb26b993" providerId="ADAL" clId="{53929D23-E160-450C-BFB9-5CA732686B3E}" dt="2020-04-30T18:19:25.594" v="123" actId="478"/>
+          <ac:cxnSpMkLst>
+            <pc:docMk/>
+            <pc:sldMk cId="777403929" sldId="259"/>
+            <ac:cxnSpMk id="10" creationId="{AA34A8FE-196D-4E75-84A0-8094E3BC7E13}"/>
+          </ac:cxnSpMkLst>
+        </pc:cxnChg>
+        <pc:cxnChg chg="del">
+          <ac:chgData name="José Guzmán" userId="cdde4e38-05f8-4ad3-adcb-d5cbeb26b993" providerId="ADAL" clId="{53929D23-E160-450C-BFB9-5CA732686B3E}" dt="2020-04-30T18:19:28.433" v="126" actId="478"/>
+          <ac:cxnSpMkLst>
+            <pc:docMk/>
+            <pc:sldMk cId="777403929" sldId="259"/>
+            <ac:cxnSpMk id="11" creationId="{CCA179AE-0447-40A5-BFF1-E15371198A0B}"/>
+          </ac:cxnSpMkLst>
+        </pc:cxnChg>
+        <pc:cxnChg chg="del">
+          <ac:chgData name="José Guzmán" userId="cdde4e38-05f8-4ad3-adcb-d5cbeb26b993" providerId="ADAL" clId="{53929D23-E160-450C-BFB9-5CA732686B3E}" dt="2020-04-30T18:19:27.837" v="125" actId="478"/>
+          <ac:cxnSpMkLst>
+            <pc:docMk/>
+            <pc:sldMk cId="777403929" sldId="259"/>
+            <ac:cxnSpMk id="13" creationId="{D025CF52-5113-46EF-8EB6-61B77F9DEF32}"/>
+          </ac:cxnSpMkLst>
+        </pc:cxnChg>
+        <pc:cxnChg chg="del">
+          <ac:chgData name="José Guzmán" userId="cdde4e38-05f8-4ad3-adcb-d5cbeb26b993" providerId="ADAL" clId="{53929D23-E160-450C-BFB9-5CA732686B3E}" dt="2020-04-30T18:19:30.067" v="128" actId="478"/>
+          <ac:cxnSpMkLst>
+            <pc:docMk/>
+            <pc:sldMk cId="777403929" sldId="259"/>
+            <ac:cxnSpMk id="14" creationId="{324E2CE4-0A33-4DDB-AE07-0AE69B210111}"/>
+          </ac:cxnSpMkLst>
+        </pc:cxnChg>
+        <pc:cxnChg chg="add mod">
+          <ac:chgData name="José Guzmán" userId="cdde4e38-05f8-4ad3-adcb-d5cbeb26b993" providerId="ADAL" clId="{53929D23-E160-450C-BFB9-5CA732686B3E}" dt="2020-04-30T18:22:48.337" v="157" actId="13822"/>
+          <ac:cxnSpMkLst>
+            <pc:docMk/>
+            <pc:sldMk cId="777403929" sldId="259"/>
+            <ac:cxnSpMk id="15" creationId="{D9ABBCB3-5636-4D4E-AFAD-A8D9A252C442}"/>
+          </ac:cxnSpMkLst>
+        </pc:cxnChg>
+        <pc:cxnChg chg="del">
+          <ac:chgData name="José Guzmán" userId="cdde4e38-05f8-4ad3-adcb-d5cbeb26b993" providerId="ADAL" clId="{53929D23-E160-450C-BFB9-5CA732686B3E}" dt="2020-04-30T18:19:29.201" v="127" actId="478"/>
+          <ac:cxnSpMkLst>
+            <pc:docMk/>
+            <pc:sldMk cId="777403929" sldId="259"/>
+            <ac:cxnSpMk id="16" creationId="{AD59E62C-253E-4B71-BC43-506575552B4E}"/>
+          </ac:cxnSpMkLst>
+        </pc:cxnChg>
+      </pc:sldChg>
+      <pc:sldChg chg="delSp modSp mod">
+        <pc:chgData name="José Guzmán" userId="cdde4e38-05f8-4ad3-adcb-d5cbeb26b993" providerId="ADAL" clId="{53929D23-E160-450C-BFB9-5CA732686B3E}" dt="2020-04-30T18:25:02.268" v="173" actId="478"/>
+        <pc:sldMkLst>
+          <pc:docMk/>
+          <pc:sldMk cId="2473559278" sldId="260"/>
+        </pc:sldMkLst>
+        <pc:spChg chg="mod">
+          <ac:chgData name="José Guzmán" userId="cdde4e38-05f8-4ad3-adcb-d5cbeb26b993" providerId="ADAL" clId="{53929D23-E160-450C-BFB9-5CA732686B3E}" dt="2020-04-30T18:24:50.989" v="171" actId="14100"/>
+          <ac:spMkLst>
+            <pc:docMk/>
+            <pc:sldMk cId="2473559278" sldId="260"/>
+            <ac:spMk id="2" creationId="{4F16EC33-EA17-4A4B-8332-C45EC4F77F5F}"/>
+          </ac:spMkLst>
+        </pc:spChg>
+        <pc:spChg chg="mod">
+          <ac:chgData name="José Guzmán" userId="cdde4e38-05f8-4ad3-adcb-d5cbeb26b993" providerId="ADAL" clId="{53929D23-E160-450C-BFB9-5CA732686B3E}" dt="2020-04-30T18:24:53.895" v="172" actId="1076"/>
+          <ac:spMkLst>
+            <pc:docMk/>
+            <pc:sldMk cId="2473559278" sldId="260"/>
+            <ac:spMk id="3" creationId="{E191FFA6-E38C-4331-B750-5A00D9B7BD1D}"/>
+          </ac:spMkLst>
+        </pc:spChg>
+        <pc:cxnChg chg="del">
+          <ac:chgData name="José Guzmán" userId="cdde4e38-05f8-4ad3-adcb-d5cbeb26b993" providerId="ADAL" clId="{53929D23-E160-450C-BFB9-5CA732686B3E}" dt="2020-04-30T18:25:02.268" v="173" actId="478"/>
+          <ac:cxnSpMkLst>
+            <pc:docMk/>
+            <pc:sldMk cId="2473559278" sldId="260"/>
+            <ac:cxnSpMk id="9" creationId="{AE251FB8-9D5E-48C8-8213-73022DAC52B1}"/>
+          </ac:cxnSpMkLst>
+        </pc:cxnChg>
+      </pc:sldChg>
+      <pc:sldChg chg="modSp mod">
+        <pc:chgData name="José Guzmán" userId="cdde4e38-05f8-4ad3-adcb-d5cbeb26b993" providerId="ADAL" clId="{53929D23-E160-450C-BFB9-5CA732686B3E}" dt="2020-04-30T18:27:10.549" v="186" actId="20577"/>
+        <pc:sldMkLst>
+          <pc:docMk/>
+          <pc:sldMk cId="1788412567" sldId="264"/>
+        </pc:sldMkLst>
+        <pc:spChg chg="mod">
+          <ac:chgData name="José Guzmán" userId="cdde4e38-05f8-4ad3-adcb-d5cbeb26b993" providerId="ADAL" clId="{53929D23-E160-450C-BFB9-5CA732686B3E}" dt="2020-04-30T18:27:10.549" v="186" actId="20577"/>
+          <ac:spMkLst>
+            <pc:docMk/>
+            <pc:sldMk cId="1788412567" sldId="264"/>
+            <ac:spMk id="2" creationId="{B2909A77-1A03-4C24-AAC1-698890198E9E}"/>
+          </ac:spMkLst>
+        </pc:spChg>
+      </pc:sldChg>
+      <pc:sldChg chg="modSp mod">
+        <pc:chgData name="José Guzmán" userId="cdde4e38-05f8-4ad3-adcb-d5cbeb26b993" providerId="ADAL" clId="{53929D23-E160-450C-BFB9-5CA732686B3E}" dt="2020-04-30T18:35:03.166" v="208" actId="1076"/>
+        <pc:sldMkLst>
+          <pc:docMk/>
+          <pc:sldMk cId="3696593171" sldId="266"/>
+        </pc:sldMkLst>
+        <pc:spChg chg="mod">
+          <ac:chgData name="José Guzmán" userId="cdde4e38-05f8-4ad3-adcb-d5cbeb26b993" providerId="ADAL" clId="{53929D23-E160-450C-BFB9-5CA732686B3E}" dt="2020-04-30T18:34:43.198" v="205" actId="1076"/>
+          <ac:spMkLst>
+            <pc:docMk/>
+            <pc:sldMk cId="3696593171" sldId="266"/>
+            <ac:spMk id="8" creationId="{1CE37680-1A59-4EE2-A249-DCC206EC0F01}"/>
+          </ac:spMkLst>
+        </pc:spChg>
+        <pc:spChg chg="mod">
+          <ac:chgData name="José Guzmán" userId="cdde4e38-05f8-4ad3-adcb-d5cbeb26b993" providerId="ADAL" clId="{53929D23-E160-450C-BFB9-5CA732686B3E}" dt="2020-04-30T18:34:50.046" v="206" actId="1076"/>
+          <ac:spMkLst>
+            <pc:docMk/>
+            <pc:sldMk cId="3696593171" sldId="266"/>
+            <ac:spMk id="9" creationId="{8AC2AD9E-F9F2-4D67-BEFD-35F42CBCD611}"/>
+          </ac:spMkLst>
+        </pc:spChg>
+        <pc:spChg chg="mod">
+          <ac:chgData name="José Guzmán" userId="cdde4e38-05f8-4ad3-adcb-d5cbeb26b993" providerId="ADAL" clId="{53929D23-E160-450C-BFB9-5CA732686B3E}" dt="2020-04-30T18:34:56.888" v="207" actId="1076"/>
+          <ac:spMkLst>
+            <pc:docMk/>
+            <pc:sldMk cId="3696593171" sldId="266"/>
+            <ac:spMk id="10" creationId="{C492027C-AC8B-44F3-AB94-E9AEA702F794}"/>
+          </ac:spMkLst>
+        </pc:spChg>
+        <pc:spChg chg="mod">
+          <ac:chgData name="José Guzmán" userId="cdde4e38-05f8-4ad3-adcb-d5cbeb26b993" providerId="ADAL" clId="{53929D23-E160-450C-BFB9-5CA732686B3E}" dt="2020-04-30T18:35:03.166" v="208" actId="1076"/>
+          <ac:spMkLst>
+            <pc:docMk/>
+            <pc:sldMk cId="3696593171" sldId="266"/>
+            <ac:spMk id="11" creationId="{182D3001-C63F-45C6-B8AE-746221A1C8A4}"/>
+          </ac:spMkLst>
+        </pc:spChg>
+      </pc:sldChg>
+      <pc:sldChg chg="modSp mod">
+        <pc:chgData name="José Guzmán" userId="cdde4e38-05f8-4ad3-adcb-d5cbeb26b993" providerId="ADAL" clId="{53929D23-E160-450C-BFB9-5CA732686B3E}" dt="2020-04-30T18:36:01.934" v="223" actId="14100"/>
+        <pc:sldMkLst>
+          <pc:docMk/>
+          <pc:sldMk cId="2302310726" sldId="267"/>
+        </pc:sldMkLst>
+        <pc:spChg chg="mod">
+          <ac:chgData name="José Guzmán" userId="cdde4e38-05f8-4ad3-adcb-d5cbeb26b993" providerId="ADAL" clId="{53929D23-E160-450C-BFB9-5CA732686B3E}" dt="2020-04-30T18:36:01.934" v="223" actId="14100"/>
+          <ac:spMkLst>
+            <pc:docMk/>
+            <pc:sldMk cId="2302310726" sldId="267"/>
+            <ac:spMk id="2" creationId="{329955D9-6D6E-472D-A2FC-DB2B90CCF77B}"/>
+          </ac:spMkLst>
+        </pc:spChg>
+        <pc:spChg chg="mod">
+          <ac:chgData name="José Guzmán" userId="cdde4e38-05f8-4ad3-adcb-d5cbeb26b993" providerId="ADAL" clId="{53929D23-E160-450C-BFB9-5CA732686B3E}" dt="2020-04-30T18:35:41.102" v="220" actId="1076"/>
+          <ac:spMkLst>
+            <pc:docMk/>
+            <pc:sldMk cId="2302310726" sldId="267"/>
+            <ac:spMk id="11" creationId="{FAE6B08E-C411-411D-B318-73E1B4DD5EF4}"/>
+          </ac:spMkLst>
+        </pc:spChg>
+        <pc:spChg chg="mod">
+          <ac:chgData name="José Guzmán" userId="cdde4e38-05f8-4ad3-adcb-d5cbeb26b993" providerId="ADAL" clId="{53929D23-E160-450C-BFB9-5CA732686B3E}" dt="2020-04-30T18:35:46.606" v="222" actId="1076"/>
+          <ac:spMkLst>
+            <pc:docMk/>
+            <pc:sldMk cId="2302310726" sldId="267"/>
+            <ac:spMk id="12" creationId="{6F766260-3237-4CAA-8E7E-CF724E457D90}"/>
+          </ac:spMkLst>
+        </pc:spChg>
+      </pc:sldChg>
+      <pc:sldChg chg="addSp delSp modSp mod">
+        <pc:chgData name="José Guzmán" userId="cdde4e38-05f8-4ad3-adcb-d5cbeb26b993" providerId="ADAL" clId="{53929D23-E160-450C-BFB9-5CA732686B3E}" dt="2020-04-30T19:09:30.117" v="1764" actId="1076"/>
+        <pc:sldMkLst>
+          <pc:docMk/>
+          <pc:sldMk cId="625205734" sldId="269"/>
+        </pc:sldMkLst>
+        <pc:spChg chg="mod">
+          <ac:chgData name="José Guzmán" userId="cdde4e38-05f8-4ad3-adcb-d5cbeb26b993" providerId="ADAL" clId="{53929D23-E160-450C-BFB9-5CA732686B3E}" dt="2020-04-30T18:36:07.590" v="224" actId="14100"/>
+          <ac:spMkLst>
+            <pc:docMk/>
+            <pc:sldMk cId="625205734" sldId="269"/>
+            <ac:spMk id="2" creationId="{329955D9-6D6E-472D-A2FC-DB2B90CCF77B}"/>
+          </ac:spMkLst>
+        </pc:spChg>
+        <pc:spChg chg="mod">
+          <ac:chgData name="José Guzmán" userId="cdde4e38-05f8-4ad3-adcb-d5cbeb26b993" providerId="ADAL" clId="{53929D23-E160-450C-BFB9-5CA732686B3E}" dt="2020-04-30T19:09:30.117" v="1764" actId="1076"/>
+          <ac:spMkLst>
+            <pc:docMk/>
+            <pc:sldMk cId="625205734" sldId="269"/>
+            <ac:spMk id="11" creationId="{45036252-F480-4C47-B499-282C859C87F4}"/>
+          </ac:spMkLst>
+        </pc:spChg>
+        <pc:spChg chg="add del mod">
+          <ac:chgData name="José Guzmán" userId="cdde4e38-05f8-4ad3-adcb-d5cbeb26b993" providerId="ADAL" clId="{53929D23-E160-450C-BFB9-5CA732686B3E}" dt="2020-04-30T19:09:29.688" v="1763" actId="478"/>
+          <ac:spMkLst>
+            <pc:docMk/>
+            <pc:sldMk cId="625205734" sldId="269"/>
+            <ac:spMk id="12" creationId="{F10B5F91-8852-4E71-9B22-0638405F3D8F}"/>
+          </ac:spMkLst>
+        </pc:spChg>
+        <pc:spChg chg="add del mod">
+          <ac:chgData name="José Guzmán" userId="cdde4e38-05f8-4ad3-adcb-d5cbeb26b993" providerId="ADAL" clId="{53929D23-E160-450C-BFB9-5CA732686B3E}" dt="2020-04-30T19:09:26.144" v="1753" actId="478"/>
+          <ac:spMkLst>
+            <pc:docMk/>
+            <pc:sldMk cId="625205734" sldId="269"/>
+            <ac:spMk id="13" creationId="{FC0497C8-A068-4BE8-8381-742A3C151C74}"/>
+          </ac:spMkLst>
+        </pc:spChg>
+      </pc:sldChg>
+      <pc:sldChg chg="modSp mod">
+        <pc:chgData name="José Guzmán" userId="cdde4e38-05f8-4ad3-adcb-d5cbeb26b993" providerId="ADAL" clId="{53929D23-E160-450C-BFB9-5CA732686B3E}" dt="2020-04-30T18:37:39.366" v="262" actId="1076"/>
+        <pc:sldMkLst>
+          <pc:docMk/>
+          <pc:sldMk cId="3354019139" sldId="270"/>
+        </pc:sldMkLst>
+        <pc:spChg chg="mod">
+          <ac:chgData name="José Guzmán" userId="cdde4e38-05f8-4ad3-adcb-d5cbeb26b993" providerId="ADAL" clId="{53929D23-E160-450C-BFB9-5CA732686B3E}" dt="2020-04-30T18:36:44.103" v="230" actId="14100"/>
+          <ac:spMkLst>
+            <pc:docMk/>
+            <pc:sldMk cId="3354019139" sldId="270"/>
+            <ac:spMk id="2" creationId="{7EC27621-25CE-406B-8448-604BB2736265}"/>
+          </ac:spMkLst>
+        </pc:spChg>
+        <pc:spChg chg="mod">
+          <ac:chgData name="José Guzmán" userId="cdde4e38-05f8-4ad3-adcb-d5cbeb26b993" providerId="ADAL" clId="{53929D23-E160-450C-BFB9-5CA732686B3E}" dt="2020-04-30T18:37:10.726" v="248" actId="1076"/>
+          <ac:spMkLst>
+            <pc:docMk/>
+            <pc:sldMk cId="3354019139" sldId="270"/>
+            <ac:spMk id="7" creationId="{04BD31EB-BCDC-4E43-ACEC-80151933593A}"/>
+          </ac:spMkLst>
+        </pc:spChg>
+        <pc:spChg chg="mod">
+          <ac:chgData name="José Guzmán" userId="cdde4e38-05f8-4ad3-adcb-d5cbeb26b993" providerId="ADAL" clId="{53929D23-E160-450C-BFB9-5CA732686B3E}" dt="2020-04-30T18:37:24.207" v="253" actId="1076"/>
+          <ac:spMkLst>
+            <pc:docMk/>
+            <pc:sldMk cId="3354019139" sldId="270"/>
+            <ac:spMk id="8" creationId="{8EDF0708-1195-447C-8175-042711511208}"/>
+          </ac:spMkLst>
+        </pc:spChg>
+        <pc:spChg chg="mod">
+          <ac:chgData name="José Guzmán" userId="cdde4e38-05f8-4ad3-adcb-d5cbeb26b993" providerId="ADAL" clId="{53929D23-E160-450C-BFB9-5CA732686B3E}" dt="2020-04-30T18:37:39.366" v="262" actId="1076"/>
+          <ac:spMkLst>
+            <pc:docMk/>
+            <pc:sldMk cId="3354019139" sldId="270"/>
+            <ac:spMk id="9" creationId="{5A1374BC-ED34-4ECF-9A52-94970932616D}"/>
+          </ac:spMkLst>
+        </pc:spChg>
+      </pc:sldChg>
+      <pc:sldChg chg="modSp mod">
+        <pc:chgData name="José Guzmán" userId="cdde4e38-05f8-4ad3-adcb-d5cbeb26b993" providerId="ADAL" clId="{53929D23-E160-450C-BFB9-5CA732686B3E}" dt="2020-04-30T18:38:01.351" v="269" actId="1076"/>
+        <pc:sldMkLst>
+          <pc:docMk/>
+          <pc:sldMk cId="3440732616" sldId="272"/>
+        </pc:sldMkLst>
+        <pc:spChg chg="mod">
+          <ac:chgData name="José Guzmán" userId="cdde4e38-05f8-4ad3-adcb-d5cbeb26b993" providerId="ADAL" clId="{53929D23-E160-450C-BFB9-5CA732686B3E}" dt="2020-04-30T18:38:01.351" v="269" actId="1076"/>
+          <ac:spMkLst>
+            <pc:docMk/>
+            <pc:sldMk cId="3440732616" sldId="272"/>
+            <ac:spMk id="10" creationId="{0CAD1963-E0E2-4BE9-B5FC-D8505AF8EFC8}"/>
+          </ac:spMkLst>
+        </pc:spChg>
+        <pc:spChg chg="mod">
+          <ac:chgData name="José Guzmán" userId="cdde4e38-05f8-4ad3-adcb-d5cbeb26b993" providerId="ADAL" clId="{53929D23-E160-450C-BFB9-5CA732686B3E}" dt="2020-04-30T18:37:58.454" v="268" actId="1076"/>
+          <ac:spMkLst>
+            <pc:docMk/>
+            <pc:sldMk cId="3440732616" sldId="272"/>
+            <ac:spMk id="11" creationId="{A9817C2C-D742-4417-81E6-22E9F91465FE}"/>
+          </ac:spMkLst>
+        </pc:spChg>
+      </pc:sldChg>
+      <pc:sldChg chg="modSp mod">
+        <pc:chgData name="José Guzmán" userId="cdde4e38-05f8-4ad3-adcb-d5cbeb26b993" providerId="ADAL" clId="{53929D23-E160-450C-BFB9-5CA732686B3E}" dt="2020-04-30T18:38:30.070" v="275" actId="1076"/>
+        <pc:sldMkLst>
+          <pc:docMk/>
+          <pc:sldMk cId="1338542520" sldId="273"/>
+        </pc:sldMkLst>
+        <pc:spChg chg="mod">
+          <ac:chgData name="José Guzmán" userId="cdde4e38-05f8-4ad3-adcb-d5cbeb26b993" providerId="ADAL" clId="{53929D23-E160-450C-BFB9-5CA732686B3E}" dt="2020-04-30T18:38:19.190" v="273" actId="1076"/>
+          <ac:spMkLst>
+            <pc:docMk/>
+            <pc:sldMk cId="1338542520" sldId="273"/>
+            <ac:spMk id="7" creationId="{575C1A2C-1D42-4642-AF64-34BF23187937}"/>
+          </ac:spMkLst>
+        </pc:spChg>
+        <pc:spChg chg="mod">
+          <ac:chgData name="José Guzmán" userId="cdde4e38-05f8-4ad3-adcb-d5cbeb26b993" providerId="ADAL" clId="{53929D23-E160-450C-BFB9-5CA732686B3E}" dt="2020-04-30T18:38:30.070" v="275" actId="1076"/>
+          <ac:spMkLst>
+            <pc:docMk/>
+            <pc:sldMk cId="1338542520" sldId="273"/>
+            <ac:spMk id="8" creationId="{5C90965D-8EE8-48D0-B062-D28CFCB32140}"/>
+          </ac:spMkLst>
+        </pc:spChg>
+      </pc:sldChg>
+      <pc:sldChg chg="modSp mod">
+        <pc:chgData name="José Guzmán" userId="cdde4e38-05f8-4ad3-adcb-d5cbeb26b993" providerId="ADAL" clId="{53929D23-E160-450C-BFB9-5CA732686B3E}" dt="2020-04-30T18:39:03.686" v="280" actId="1076"/>
+        <pc:sldMkLst>
+          <pc:docMk/>
+          <pc:sldMk cId="1287327503" sldId="274"/>
+        </pc:sldMkLst>
+        <pc:spChg chg="mod">
+          <ac:chgData name="José Guzmán" userId="cdde4e38-05f8-4ad3-adcb-d5cbeb26b993" providerId="ADAL" clId="{53929D23-E160-450C-BFB9-5CA732686B3E}" dt="2020-04-30T18:38:41.782" v="276" actId="1076"/>
+          <ac:spMkLst>
+            <pc:docMk/>
+            <pc:sldMk cId="1287327503" sldId="274"/>
+            <ac:spMk id="7" creationId="{FFBB4622-0DF2-438D-B3B1-D899F6897803}"/>
+          </ac:spMkLst>
+        </pc:spChg>
+        <pc:spChg chg="mod">
+          <ac:chgData name="José Guzmán" userId="cdde4e38-05f8-4ad3-adcb-d5cbeb26b993" providerId="ADAL" clId="{53929D23-E160-450C-BFB9-5CA732686B3E}" dt="2020-04-30T18:38:58.735" v="279" actId="1076"/>
+          <ac:spMkLst>
+            <pc:docMk/>
+            <pc:sldMk cId="1287327503" sldId="274"/>
+            <ac:spMk id="8" creationId="{4687113C-D348-446B-A943-A309D2B5FF0C}"/>
+          </ac:spMkLst>
+        </pc:spChg>
+        <pc:spChg chg="mod">
+          <ac:chgData name="José Guzmán" userId="cdde4e38-05f8-4ad3-adcb-d5cbeb26b993" providerId="ADAL" clId="{53929D23-E160-450C-BFB9-5CA732686B3E}" dt="2020-04-30T18:39:03.686" v="280" actId="1076"/>
+          <ac:spMkLst>
+            <pc:docMk/>
+            <pc:sldMk cId="1287327503" sldId="274"/>
+            <ac:spMk id="9" creationId="{7D2214C9-37E2-4663-92BA-BD2A0C8D113E}"/>
+          </ac:spMkLst>
+        </pc:spChg>
+      </pc:sldChg>
+      <pc:sldChg chg="modSp mod">
+        <pc:chgData name="José Guzmán" userId="cdde4e38-05f8-4ad3-adcb-d5cbeb26b993" providerId="ADAL" clId="{53929D23-E160-450C-BFB9-5CA732686B3E}" dt="2020-04-30T18:39:21.166" v="284" actId="1076"/>
+        <pc:sldMkLst>
+          <pc:docMk/>
+          <pc:sldMk cId="3549317479" sldId="275"/>
+        </pc:sldMkLst>
+        <pc:spChg chg="mod">
+          <ac:chgData name="José Guzmán" userId="cdde4e38-05f8-4ad3-adcb-d5cbeb26b993" providerId="ADAL" clId="{53929D23-E160-450C-BFB9-5CA732686B3E}" dt="2020-04-30T18:39:11.789" v="282" actId="1076"/>
+          <ac:spMkLst>
+            <pc:docMk/>
+            <pc:sldMk cId="3549317479" sldId="275"/>
+            <ac:spMk id="7" creationId="{2325ACBF-4A07-4FEB-B584-91BAFFDCA4BF}"/>
+          </ac:spMkLst>
+        </pc:spChg>
+        <pc:spChg chg="mod">
+          <ac:chgData name="José Guzmán" userId="cdde4e38-05f8-4ad3-adcb-d5cbeb26b993" providerId="ADAL" clId="{53929D23-E160-450C-BFB9-5CA732686B3E}" dt="2020-04-30T18:39:21.166" v="284" actId="1076"/>
+          <ac:spMkLst>
+            <pc:docMk/>
+            <pc:sldMk cId="3549317479" sldId="275"/>
+            <ac:spMk id="8" creationId="{8D55E0BB-20A9-4549-87C7-9FB6632F8677}"/>
+          </ac:spMkLst>
+        </pc:spChg>
+      </pc:sldChg>
+      <pc:sldChg chg="modSp mod">
+        <pc:chgData name="José Guzmán" userId="cdde4e38-05f8-4ad3-adcb-d5cbeb26b993" providerId="ADAL" clId="{53929D23-E160-450C-BFB9-5CA732686B3E}" dt="2020-04-30T18:50:58.287" v="1168" actId="1076"/>
+        <pc:sldMkLst>
+          <pc:docMk/>
+          <pc:sldMk cId="969627334" sldId="277"/>
+        </pc:sldMkLst>
+        <pc:spChg chg="mod">
+          <ac:chgData name="José Guzmán" userId="cdde4e38-05f8-4ad3-adcb-d5cbeb26b993" providerId="ADAL" clId="{53929D23-E160-450C-BFB9-5CA732686B3E}" dt="2020-04-30T18:50:54.093" v="1166" actId="14100"/>
+          <ac:spMkLst>
+            <pc:docMk/>
+            <pc:sldMk cId="969627334" sldId="277"/>
+            <ac:spMk id="2" creationId="{9B3B6AD1-8BBA-4F7C-857A-E1C4369C2A17}"/>
+          </ac:spMkLst>
+        </pc:spChg>
+        <pc:spChg chg="mod">
+          <ac:chgData name="José Guzmán" userId="cdde4e38-05f8-4ad3-adcb-d5cbeb26b993" providerId="ADAL" clId="{53929D23-E160-450C-BFB9-5CA732686B3E}" dt="2020-04-30T18:50:58.287" v="1168" actId="1076"/>
+          <ac:spMkLst>
+            <pc:docMk/>
+            <pc:sldMk cId="969627334" sldId="277"/>
+            <ac:spMk id="3" creationId="{B4A6FA3F-D663-4224-A60D-DCC1BC6D559B}"/>
+          </ac:spMkLst>
+        </pc:spChg>
+      </pc:sldChg>
+      <pc:sldChg chg="addSp modSp mod">
+        <pc:chgData name="José Guzmán" userId="cdde4e38-05f8-4ad3-adcb-d5cbeb26b993" providerId="ADAL" clId="{53929D23-E160-450C-BFB9-5CA732686B3E}" dt="2020-04-30T18:33:26.998" v="198" actId="1076"/>
+        <pc:sldMkLst>
+          <pc:docMk/>
+          <pc:sldMk cId="1602132630" sldId="278"/>
+        </pc:sldMkLst>
+        <pc:spChg chg="mod">
+          <ac:chgData name="José Guzmán" userId="cdde4e38-05f8-4ad3-adcb-d5cbeb26b993" providerId="ADAL" clId="{53929D23-E160-450C-BFB9-5CA732686B3E}" dt="2020-04-30T18:32:21.299" v="193" actId="1076"/>
+          <ac:spMkLst>
+            <pc:docMk/>
+            <pc:sldMk cId="1602132630" sldId="278"/>
+            <ac:spMk id="2" creationId="{841E52CB-F37E-40F3-BAF2-965E5F85610D}"/>
+          </ac:spMkLst>
+        </pc:spChg>
+        <pc:picChg chg="add">
+          <ac:chgData name="José Guzmán" userId="cdde4e38-05f8-4ad3-adcb-d5cbeb26b993" providerId="ADAL" clId="{53929D23-E160-450C-BFB9-5CA732686B3E}" dt="2020-04-30T18:31:26.048" v="187"/>
+          <ac:picMkLst>
+            <pc:docMk/>
+            <pc:sldMk cId="1602132630" sldId="278"/>
+            <ac:picMk id="3" creationId="{0BB3D6D4-9671-4AA0-AEDE-76BD0E3E82E5}"/>
+          </ac:picMkLst>
+        </pc:picChg>
+        <pc:picChg chg="add mod">
+          <ac:chgData name="José Guzmán" userId="cdde4e38-05f8-4ad3-adcb-d5cbeb26b993" providerId="ADAL" clId="{53929D23-E160-450C-BFB9-5CA732686B3E}" dt="2020-04-30T18:31:40.711" v="189" actId="1076"/>
+          <ac:picMkLst>
+            <pc:docMk/>
+            <pc:sldMk cId="1602132630" sldId="278"/>
+            <ac:picMk id="4" creationId="{51667B53-5117-419C-8584-0E0FCC084F86}"/>
+          </ac:picMkLst>
+        </pc:picChg>
+        <pc:picChg chg="add mod">
+          <ac:chgData name="José Guzmán" userId="cdde4e38-05f8-4ad3-adcb-d5cbeb26b993" providerId="ADAL" clId="{53929D23-E160-450C-BFB9-5CA732686B3E}" dt="2020-04-30T18:31:59.550" v="191" actId="1076"/>
+          <ac:picMkLst>
+            <pc:docMk/>
+            <pc:sldMk cId="1602132630" sldId="278"/>
+            <ac:picMk id="5" creationId="{54FA2BE7-180E-485A-BADD-674D0B35DBA3}"/>
+          </ac:picMkLst>
+        </pc:picChg>
+        <pc:picChg chg="add mod">
+          <ac:chgData name="José Guzmán" userId="cdde4e38-05f8-4ad3-adcb-d5cbeb26b993" providerId="ADAL" clId="{53929D23-E160-450C-BFB9-5CA732686B3E}" dt="2020-04-30T18:33:26.998" v="198" actId="1076"/>
+          <ac:picMkLst>
+            <pc:docMk/>
+            <pc:sldMk cId="1602132630" sldId="278"/>
+            <ac:picMk id="2050" creationId="{4954585D-7096-4424-9065-133F108696CF}"/>
+          </ac:picMkLst>
+        </pc:picChg>
+      </pc:sldChg>
+      <pc:sldChg chg="addSp modSp new mod setBg">
+        <pc:chgData name="José Guzmán" userId="cdde4e38-05f8-4ad3-adcb-d5cbeb26b993" providerId="ADAL" clId="{53929D23-E160-450C-BFB9-5CA732686B3E}" dt="2020-04-30T18:56:49.999" v="1720" actId="26606"/>
+        <pc:sldMkLst>
+          <pc:docMk/>
+          <pc:sldMk cId="564495082" sldId="282"/>
+        </pc:sldMkLst>
+        <pc:spChg chg="mod">
+          <ac:chgData name="José Guzmán" userId="cdde4e38-05f8-4ad3-adcb-d5cbeb26b993" providerId="ADAL" clId="{53929D23-E160-450C-BFB9-5CA732686B3E}" dt="2020-04-30T18:56:49.999" v="1720" actId="26606"/>
+          <ac:spMkLst>
+            <pc:docMk/>
+            <pc:sldMk cId="564495082" sldId="282"/>
+            <ac:spMk id="2" creationId="{E6331B13-3143-46BE-ACA3-4787F6FF850E}"/>
+          </ac:spMkLst>
+        </pc:spChg>
+        <pc:spChg chg="mod">
+          <ac:chgData name="José Guzmán" userId="cdde4e38-05f8-4ad3-adcb-d5cbeb26b993" providerId="ADAL" clId="{53929D23-E160-450C-BFB9-5CA732686B3E}" dt="2020-04-30T18:56:49.999" v="1720" actId="26606"/>
+          <ac:spMkLst>
+            <pc:docMk/>
+            <pc:sldMk cId="564495082" sldId="282"/>
+            <ac:spMk id="3" creationId="{68681059-C3D2-4A31-A295-BCC404D0185A}"/>
+          </ac:spMkLst>
+        </pc:spChg>
+        <pc:picChg chg="add mod">
+          <ac:chgData name="José Guzmán" userId="cdde4e38-05f8-4ad3-adcb-d5cbeb26b993" providerId="ADAL" clId="{53929D23-E160-450C-BFB9-5CA732686B3E}" dt="2020-04-30T18:56:49.999" v="1720" actId="26606"/>
+          <ac:picMkLst>
+            <pc:docMk/>
+            <pc:sldMk cId="564495082" sldId="282"/>
+            <ac:picMk id="3074" creationId="{151B2F61-EB89-46C7-9547-E7751F3A0B01}"/>
+          </ac:picMkLst>
+        </pc:picChg>
+      </pc:sldChg>
+    </pc:docChg>
+  </pc:docChgLst>
+</pc:chgInfo>
 </file>
 
 <file path=ppt/notesMasters/notesMaster1.xml><?xml version="1.0" encoding="utf-8"?>
@@ -212,7 +784,7 @@
           <a:p>
             <a:fld id="{8A24C7C6-5196-4F34-9CFE-668D197F49EB}" type="datetimeFigureOut">
               <a:rPr lang="en-US" smtClean="0"/>
-              <a:t>4/30/2020</a:t>
+              <a:t>5/3/2020</a:t>
             </a:fld>
             <a:endParaRPr lang="en-US"/>
           </a:p>
@@ -523,6 +1095,90 @@
           <a:bodyPr/>
           <a:lstStyle/>
           <a:p>
+            <a:endParaRPr lang="en-US" dirty="0"/>
+          </a:p>
+        </p:txBody>
+      </p:sp>
+      <p:sp>
+        <p:nvSpPr>
+          <p:cNvPr id="4" name="Slide Number Placeholder 3"/>
+          <p:cNvSpPr>
+            <a:spLocks noGrp="1"/>
+          </p:cNvSpPr>
+          <p:nvPr>
+            <p:ph type="sldNum" sz="quarter" idx="5"/>
+          </p:nvPr>
+        </p:nvSpPr>
+        <p:spPr/>
+        <p:txBody>
+          <a:bodyPr/>
+          <a:lstStyle/>
+          <a:p>
+            <a:fld id="{FC60A3F7-5FFF-4A78-900A-FA8AB1E057FD}" type="slidenum">
+              <a:rPr lang="en-US" smtClean="0"/>
+              <a:t>1</a:t>
+            </a:fld>
+            <a:endParaRPr lang="en-US"/>
+          </a:p>
+        </p:txBody>
+      </p:sp>
+    </p:spTree>
+    <p:extLst>
+      <p:ext uri="{BB962C8B-B14F-4D97-AF65-F5344CB8AC3E}">
+        <p14:creationId xmlns:p14="http://schemas.microsoft.com/office/powerpoint/2010/main" val="1858456635"/>
+      </p:ext>
+    </p:extLst>
+  </p:cSld>
+  <p:clrMapOvr>
+    <a:masterClrMapping/>
+  </p:clrMapOvr>
+</p:notes>
+</file>
+
+<file path=ppt/notesSlides/notesSlide2.xml><?xml version="1.0" encoding="utf-8"?>
+<p:notes xmlns:a="http://schemas.openxmlformats.org/drawingml/2006/main" xmlns:r="http://schemas.openxmlformats.org/officeDocument/2006/relationships" xmlns:p="http://schemas.openxmlformats.org/presentationml/2006/main">
+  <p:cSld>
+    <p:spTree>
+      <p:nvGrpSpPr>
+        <p:cNvPr id="1" name=""/>
+        <p:cNvGrpSpPr/>
+        <p:nvPr/>
+      </p:nvGrpSpPr>
+      <p:grpSpPr>
+        <a:xfrm>
+          <a:off x="0" y="0"/>
+          <a:ext cx="0" cy="0"/>
+          <a:chOff x="0" y="0"/>
+          <a:chExt cx="0" cy="0"/>
+        </a:xfrm>
+      </p:grpSpPr>
+      <p:sp>
+        <p:nvSpPr>
+          <p:cNvPr id="2" name="Slide Image Placeholder 1"/>
+          <p:cNvSpPr>
+            <a:spLocks noGrp="1" noRot="1" noChangeAspect="1"/>
+          </p:cNvSpPr>
+          <p:nvPr>
+            <p:ph type="sldImg"/>
+          </p:nvPr>
+        </p:nvSpPr>
+        <p:spPr/>
+      </p:sp>
+      <p:sp>
+        <p:nvSpPr>
+          <p:cNvPr id="3" name="Notes Placeholder 2"/>
+          <p:cNvSpPr>
+            <a:spLocks noGrp="1"/>
+          </p:cNvSpPr>
+          <p:nvPr>
+            <p:ph type="body" idx="1"/>
+          </p:nvPr>
+        </p:nvSpPr>
+        <p:spPr/>
+        <p:txBody>
+          <a:bodyPr/>
+          <a:lstStyle/>
+          <a:p>
             <a:r>
               <a:rPr lang="en-US" dirty="0" err="1"/>
               <a:t>Uso</a:t>
@@ -841,7 +1497,7 @@
           <a:p>
             <a:fld id="{49F555AD-3BBC-4B7C-B90E-BCFA1EEA5954}" type="datetimeFigureOut">
               <a:rPr lang="en-US" smtClean="0"/>
-              <a:t>4/29/2020</a:t>
+              <a:t>5/3/2020</a:t>
             </a:fld>
             <a:endParaRPr lang="en-US"/>
           </a:p>
@@ -1031,7 +1687,7 @@
           <a:p>
             <a:fld id="{49F555AD-3BBC-4B7C-B90E-BCFA1EEA5954}" type="datetimeFigureOut">
               <a:rPr lang="en-US" smtClean="0"/>
-              <a:t>4/29/2020</a:t>
+              <a:t>5/3/2020</a:t>
             </a:fld>
             <a:endParaRPr lang="en-US"/>
           </a:p>
@@ -1211,7 +1867,7 @@
           <a:p>
             <a:fld id="{49F555AD-3BBC-4B7C-B90E-BCFA1EEA5954}" type="datetimeFigureOut">
               <a:rPr lang="en-US" smtClean="0"/>
-              <a:t>4/29/2020</a:t>
+              <a:t>5/3/2020</a:t>
             </a:fld>
             <a:endParaRPr lang="en-US"/>
           </a:p>
@@ -1381,7 +2037,7 @@
           <a:p>
             <a:fld id="{49F555AD-3BBC-4B7C-B90E-BCFA1EEA5954}" type="datetimeFigureOut">
               <a:rPr lang="en-US" smtClean="0"/>
-              <a:t>4/29/2020</a:t>
+              <a:t>5/3/2020</a:t>
             </a:fld>
             <a:endParaRPr lang="en-US"/>
           </a:p>
@@ -1637,7 +2293,7 @@
           <a:p>
             <a:fld id="{49F555AD-3BBC-4B7C-B90E-BCFA1EEA5954}" type="datetimeFigureOut">
               <a:rPr lang="en-US" smtClean="0"/>
-              <a:t>4/29/2020</a:t>
+              <a:t>5/3/2020</a:t>
             </a:fld>
             <a:endParaRPr lang="en-US"/>
           </a:p>
@@ -1925,7 +2581,7 @@
           <a:p>
             <a:fld id="{49F555AD-3BBC-4B7C-B90E-BCFA1EEA5954}" type="datetimeFigureOut">
               <a:rPr lang="en-US" smtClean="0"/>
-              <a:t>4/29/2020</a:t>
+              <a:t>5/3/2020</a:t>
             </a:fld>
             <a:endParaRPr lang="en-US"/>
           </a:p>
@@ -2363,7 +3019,7 @@
           <a:p>
             <a:fld id="{49F555AD-3BBC-4B7C-B90E-BCFA1EEA5954}" type="datetimeFigureOut">
               <a:rPr lang="en-US" smtClean="0"/>
-              <a:t>4/29/2020</a:t>
+              <a:t>5/3/2020</a:t>
             </a:fld>
             <a:endParaRPr lang="en-US"/>
           </a:p>
@@ -2481,7 +3137,7 @@
           <a:p>
             <a:fld id="{49F555AD-3BBC-4B7C-B90E-BCFA1EEA5954}" type="datetimeFigureOut">
               <a:rPr lang="en-US" smtClean="0"/>
-              <a:t>4/29/2020</a:t>
+              <a:t>5/3/2020</a:t>
             </a:fld>
             <a:endParaRPr lang="en-US"/>
           </a:p>
@@ -2576,7 +3232,7 @@
           <a:p>
             <a:fld id="{49F555AD-3BBC-4B7C-B90E-BCFA1EEA5954}" type="datetimeFigureOut">
               <a:rPr lang="en-US" smtClean="0"/>
-              <a:t>4/29/2020</a:t>
+              <a:t>5/3/2020</a:t>
             </a:fld>
             <a:endParaRPr lang="en-US"/>
           </a:p>
@@ -2932,7 +3588,7 @@
           <a:p>
             <a:fld id="{49F555AD-3BBC-4B7C-B90E-BCFA1EEA5954}" type="datetimeFigureOut">
               <a:rPr lang="en-US" smtClean="0"/>
-              <a:t>4/29/2020</a:t>
+              <a:t>5/3/2020</a:t>
             </a:fld>
             <a:endParaRPr lang="en-US"/>
           </a:p>
@@ -3248,7 +3904,7 @@
           <a:p>
             <a:fld id="{49F555AD-3BBC-4B7C-B90E-BCFA1EEA5954}" type="datetimeFigureOut">
               <a:rPr lang="en-US" smtClean="0"/>
-              <a:t>4/29/2020</a:t>
+              <a:t>5/3/2020</a:t>
             </a:fld>
             <a:endParaRPr lang="en-US"/>
           </a:p>
@@ -3481,7 +4137,7 @@
           <a:p>
             <a:fld id="{49F555AD-3BBC-4B7C-B90E-BCFA1EEA5954}" type="datetimeFigureOut">
               <a:rPr lang="en-US" smtClean="0"/>
-              <a:t>4/29/2020</a:t>
+              <a:t>5/3/2020</a:t>
             </a:fld>
             <a:endParaRPr lang="en-US"/>
           </a:p>
@@ -4290,13 +4946,13 @@
         </p:nvSpPr>
         <p:spPr>
           <a:xfrm>
-            <a:off x="843135" y="4878248"/>
-            <a:ext cx="2175184" cy="435715"/>
+            <a:off x="768986" y="4712207"/>
+            <a:ext cx="2323481" cy="435715"/>
           </a:xfrm>
         </p:spPr>
         <p:txBody>
           <a:bodyPr>
-            <a:normAutofit fontScale="92500"/>
+            <a:normAutofit/>
           </a:bodyPr>
           <a:lstStyle/>
           <a:p>
@@ -4326,7 +4982,7 @@
         </p:nvSpPr>
         <p:spPr>
           <a:xfrm>
-            <a:off x="3821204" y="4878248"/>
+            <a:off x="3821204" y="4712207"/>
             <a:ext cx="1562569" cy="435715"/>
           </a:xfrm>
           <a:prstGeom prst="rect">
@@ -4557,7 +5213,7 @@
         </p:nvSpPr>
         <p:spPr>
           <a:xfrm>
-            <a:off x="6496216" y="4878248"/>
+            <a:off x="6496216" y="4741651"/>
             <a:ext cx="1562569" cy="435715"/>
           </a:xfrm>
           <a:prstGeom prst="rect">
@@ -4787,7 +5443,7 @@
         </p:nvSpPr>
         <p:spPr>
           <a:xfrm>
-            <a:off x="9358362" y="4878248"/>
+            <a:off x="9155025" y="4712206"/>
             <a:ext cx="1562569" cy="435715"/>
           </a:xfrm>
           <a:prstGeom prst="rect">
@@ -5050,7 +5706,7 @@
         <p:spPr>
           <a:xfrm>
             <a:off x="657224" y="499533"/>
-            <a:ext cx="10772775" cy="1400705"/>
+            <a:ext cx="10772775" cy="1157311"/>
           </a:xfrm>
         </p:spPr>
         <p:txBody>
@@ -5173,13 +5829,13 @@
         </p:nvSpPr>
         <p:spPr>
           <a:xfrm>
-            <a:off x="3151057" y="5922752"/>
-            <a:ext cx="2175184" cy="435715"/>
+            <a:off x="3005662" y="5877432"/>
+            <a:ext cx="2465973" cy="435715"/>
           </a:xfrm>
         </p:spPr>
         <p:txBody>
           <a:bodyPr>
-            <a:normAutofit fontScale="85000" lnSpcReduction="10000"/>
+            <a:normAutofit/>
           </a:bodyPr>
           <a:lstStyle/>
           <a:p>
@@ -5209,8 +5865,8 @@
         </p:nvSpPr>
         <p:spPr>
           <a:xfrm>
-            <a:off x="6989584" y="5891570"/>
-            <a:ext cx="2175184" cy="435715"/>
+            <a:off x="7041531" y="5784692"/>
+            <a:ext cx="2071289" cy="421577"/>
           </a:xfrm>
           <a:prstGeom prst="rect">
             <a:avLst/>
@@ -5469,7 +6125,12 @@
             <p:ph type="title"/>
           </p:nvPr>
         </p:nvSpPr>
-        <p:spPr/>
+        <p:spPr>
+          <a:xfrm>
+            <a:off x="657224" y="499533"/>
+            <a:ext cx="10772775" cy="1198638"/>
+          </a:xfrm>
+        </p:spPr>
         <p:txBody>
           <a:bodyPr/>
           <a:lstStyle/>
@@ -5588,7 +6249,7 @@
         </p:nvSpPr>
         <p:spPr>
           <a:xfrm>
-            <a:off x="1802489" y="5699728"/>
+            <a:off x="1802489" y="5525269"/>
             <a:ext cx="913587" cy="435715"/>
           </a:xfrm>
           <a:prstGeom prst="rect">
@@ -5818,7 +6479,7 @@
         </p:nvSpPr>
         <p:spPr>
           <a:xfrm>
-            <a:off x="5639206" y="5699728"/>
+            <a:off x="5639206" y="5568937"/>
             <a:ext cx="913587" cy="435715"/>
           </a:xfrm>
           <a:prstGeom prst="rect">
@@ -6048,8 +6709,8 @@
         </p:nvSpPr>
         <p:spPr>
           <a:xfrm>
-            <a:off x="9033566" y="5699727"/>
-            <a:ext cx="1567615" cy="435715"/>
+            <a:off x="8926688" y="5525269"/>
+            <a:ext cx="1784855" cy="435715"/>
           </a:xfrm>
           <a:prstGeom prst="rect">
             <a:avLst/>
@@ -6057,7 +6718,7 @@
         </p:spPr>
         <p:txBody>
           <a:bodyPr vert="horz" lIns="91440" tIns="45720" rIns="91440" bIns="45720" rtlCol="0">
-            <a:normAutofit fontScale="85000" lnSpcReduction="10000"/>
+            <a:normAutofit/>
           </a:bodyPr>
           <a:lstStyle>
             <a:lvl1pPr marL="91440" indent="-91440" algn="l" defTabSz="914400" rtl="0" eaLnBrk="1" latinLnBrk="0" hangingPunct="1">
@@ -6412,7 +7073,12 @@
             <p:ph type="title"/>
           </p:nvPr>
         </p:nvSpPr>
-        <p:spPr/>
+        <p:spPr>
+          <a:xfrm>
+            <a:off x="657224" y="499533"/>
+            <a:ext cx="10772775" cy="1367260"/>
+          </a:xfrm>
+        </p:spPr>
         <p:txBody>
           <a:bodyPr/>
           <a:lstStyle/>
@@ -6556,8 +7222,8 @@
         </p:nvSpPr>
         <p:spPr>
           <a:xfrm>
-            <a:off x="1480786" y="5922752"/>
-            <a:ext cx="1510412" cy="435715"/>
+            <a:off x="1042521" y="5794906"/>
+            <a:ext cx="2386941" cy="435714"/>
           </a:xfrm>
           <a:prstGeom prst="rect">
             <a:avLst/>
@@ -6565,7 +7231,7 @@
         </p:spPr>
         <p:txBody>
           <a:bodyPr vert="horz" lIns="91440" tIns="45720" rIns="91440" bIns="45720" rtlCol="0">
-            <a:normAutofit fontScale="62500" lnSpcReduction="20000"/>
+            <a:normAutofit/>
           </a:bodyPr>
           <a:lstStyle>
             <a:lvl1pPr marL="91440" indent="-91440" algn="l" defTabSz="914400" rtl="0" eaLnBrk="1" latinLnBrk="0" hangingPunct="1">
@@ -6786,8 +7452,8 @@
         </p:nvSpPr>
         <p:spPr>
           <a:xfrm>
-            <a:off x="5427708" y="5922751"/>
-            <a:ext cx="1510412" cy="435715"/>
+            <a:off x="5206254" y="5747384"/>
+            <a:ext cx="1779491" cy="715555"/>
           </a:xfrm>
           <a:prstGeom prst="rect">
             <a:avLst/>
@@ -6795,7 +7461,7 @@
         </p:spPr>
         <p:txBody>
           <a:bodyPr vert="horz" lIns="91440" tIns="45720" rIns="91440" bIns="45720" rtlCol="0">
-            <a:normAutofit fontScale="62500" lnSpcReduction="20000"/>
+            <a:normAutofit lnSpcReduction="10000"/>
           </a:bodyPr>
           <a:lstStyle>
             <a:lvl1pPr marL="91440" indent="-91440" algn="l" defTabSz="914400" rtl="0" eaLnBrk="1" latinLnBrk="0" hangingPunct="1">
@@ -7016,8 +7682,8 @@
         </p:nvSpPr>
         <p:spPr>
           <a:xfrm>
-            <a:off x="9374630" y="5922751"/>
-            <a:ext cx="1510412" cy="435715"/>
+            <a:off x="9095508" y="5780627"/>
+            <a:ext cx="2078181" cy="540189"/>
           </a:xfrm>
           <a:prstGeom prst="rect">
             <a:avLst/>
@@ -7025,7 +7691,7 @@
         </p:spPr>
         <p:txBody>
           <a:bodyPr vert="horz" lIns="91440" tIns="45720" rIns="91440" bIns="45720" rtlCol="0">
-            <a:normAutofit fontScale="70000" lnSpcReduction="20000"/>
+            <a:normAutofit/>
           </a:bodyPr>
           <a:lstStyle>
             <a:lvl1pPr marL="91440" indent="-91440" algn="l" defTabSz="914400" rtl="0" eaLnBrk="1" latinLnBrk="0" hangingPunct="1">
@@ -7402,8 +8068,8 @@
         </p:nvSpPr>
         <p:spPr>
           <a:xfrm>
-            <a:off x="1215016" y="5922752"/>
-            <a:ext cx="2077672" cy="435715"/>
+            <a:off x="1110126" y="5851259"/>
+            <a:ext cx="2287452" cy="449137"/>
           </a:xfrm>
           <a:prstGeom prst="rect">
             <a:avLst/>
@@ -7411,7 +8077,7 @@
         </p:spPr>
         <p:txBody>
           <a:bodyPr vert="horz" lIns="91440" tIns="45720" rIns="91440" bIns="45720" rtlCol="0">
-            <a:normAutofit fontScale="92500"/>
+            <a:normAutofit/>
           </a:bodyPr>
           <a:lstStyle>
             <a:lvl1pPr marL="91440" indent="-91440" algn="l" defTabSz="914400" rtl="0" eaLnBrk="1" latinLnBrk="0" hangingPunct="1">
@@ -7632,8 +8298,8 @@
         </p:nvSpPr>
         <p:spPr>
           <a:xfrm>
-            <a:off x="6951336" y="5936174"/>
-            <a:ext cx="2287452" cy="435715"/>
+            <a:off x="6737473" y="5869303"/>
+            <a:ext cx="2715178" cy="607130"/>
           </a:xfrm>
           <a:prstGeom prst="rect">
             <a:avLst/>
@@ -7641,7 +8307,7 @@
         </p:spPr>
         <p:txBody>
           <a:bodyPr vert="horz" lIns="91440" tIns="45720" rIns="91440" bIns="45720" rtlCol="0">
-            <a:normAutofit fontScale="85000" lnSpcReduction="10000"/>
+            <a:normAutofit/>
           </a:bodyPr>
           <a:lstStyle>
             <a:lvl1pPr marL="91440" indent="-91440" algn="l" defTabSz="914400" rtl="0" eaLnBrk="1" latinLnBrk="0" hangingPunct="1">
@@ -8016,8 +8682,8 @@
         </p:nvSpPr>
         <p:spPr>
           <a:xfrm>
-            <a:off x="3193375" y="5880419"/>
-            <a:ext cx="2287452" cy="435715"/>
+            <a:off x="2885045" y="5566020"/>
+            <a:ext cx="2661160" cy="478048"/>
           </a:xfrm>
           <a:prstGeom prst="rect">
             <a:avLst/>
@@ -8025,7 +8691,7 @@
         </p:spPr>
         <p:txBody>
           <a:bodyPr vert="horz" lIns="91440" tIns="45720" rIns="91440" bIns="45720" rtlCol="0">
-            <a:normAutofit fontScale="85000" lnSpcReduction="10000"/>
+            <a:normAutofit/>
           </a:bodyPr>
           <a:lstStyle>
             <a:lvl1pPr marL="91440" indent="-91440" algn="l" defTabSz="914400" rtl="0" eaLnBrk="1" latinLnBrk="0" hangingPunct="1">
@@ -8246,8 +8912,8 @@
         </p:nvSpPr>
         <p:spPr>
           <a:xfrm>
-            <a:off x="9142547" y="5662561"/>
-            <a:ext cx="2287452" cy="435715"/>
+            <a:off x="9306955" y="5566020"/>
+            <a:ext cx="1248362" cy="478048"/>
           </a:xfrm>
           <a:prstGeom prst="rect">
             <a:avLst/>
@@ -8730,7 +9396,7 @@
         </p:nvSpPr>
         <p:spPr>
           <a:xfrm>
-            <a:off x="1021701" y="5700685"/>
+            <a:off x="1021701" y="5635238"/>
             <a:ext cx="2287452" cy="435715"/>
           </a:xfrm>
           <a:prstGeom prst="rect">
@@ -8960,8 +9626,8 @@
         </p:nvSpPr>
         <p:spPr>
           <a:xfrm>
-            <a:off x="5323258" y="5698582"/>
-            <a:ext cx="2287452" cy="435715"/>
+            <a:off x="5236595" y="5635239"/>
+            <a:ext cx="1718810" cy="435714"/>
           </a:xfrm>
           <a:prstGeom prst="rect">
             <a:avLst/>
@@ -9168,10 +9834,9 @@
               <a:buNone/>
             </a:pPr>
             <a:r>
-              <a:rPr lang="es-GT" dirty="0" err="1"/>
-              <a:t>Diágonales</a:t>
-            </a:r>
-            <a:endParaRPr lang="es-GT" dirty="0"/>
+              <a:rPr lang="es-GT" dirty="0"/>
+              <a:t>Diagonales</a:t>
+            </a:r>
           </a:p>
         </p:txBody>
       </p:sp>
@@ -9191,7 +9856,7 @@
         </p:nvSpPr>
         <p:spPr>
           <a:xfrm>
-            <a:off x="8784576" y="5698581"/>
+            <a:off x="8784576" y="5635237"/>
             <a:ext cx="2287452" cy="435715"/>
           </a:xfrm>
           <a:prstGeom prst="rect">
@@ -9421,6 +10086,14 @@
 <file path=ppt/slides/slide2.xml><?xml version="1.0" encoding="utf-8"?>
 <p:sld xmlns:a="http://schemas.openxmlformats.org/drawingml/2006/main" xmlns:r="http://schemas.openxmlformats.org/officeDocument/2006/relationships" xmlns:p="http://schemas.openxmlformats.org/presentationml/2006/main">
   <p:cSld>
+    <p:bg>
+      <p:bgPr>
+        <a:solidFill>
+          <a:schemeClr val="bg1"/>
+        </a:solidFill>
+        <a:effectLst/>
+      </p:bgPr>
+    </p:bg>
     <p:spTree>
       <p:nvGrpSpPr>
         <p:cNvPr id="1" name=""/>
@@ -9451,16 +10124,31 @@
             <p:ph type="title"/>
           </p:nvPr>
         </p:nvSpPr>
-        <p:spPr/>
+        <p:spPr>
+          <a:xfrm>
+            <a:off x="657225" y="499533"/>
+            <a:ext cx="7115176" cy="1412394"/>
+          </a:xfrm>
+        </p:spPr>
         <p:txBody>
-          <a:bodyPr/>
+          <a:bodyPr>
+            <a:normAutofit/>
+          </a:bodyPr>
           <a:lstStyle/>
           <a:p>
             <a:r>
-              <a:rPr lang="es-GT" dirty="0"/>
+              <a:rPr lang="es-GT" dirty="0">
+                <a:solidFill>
+                  <a:srgbClr val="4B5F76"/>
+                </a:solidFill>
+              </a:rPr>
               <a:t>Contenido</a:t>
             </a:r>
-            <a:endParaRPr lang="en-US" dirty="0"/>
+            <a:endParaRPr lang="en-US" dirty="0">
+              <a:solidFill>
+                <a:srgbClr val="4B5F76"/>
+              </a:solidFill>
+            </a:endParaRPr>
           </a:p>
         </p:txBody>
       </p:sp>
@@ -9482,12 +10170,14 @@
         </p:nvSpPr>
         <p:spPr>
           <a:xfrm>
-            <a:off x="676656" y="2011681"/>
-            <a:ext cx="5419344" cy="2791138"/>
+            <a:off x="657225" y="2157731"/>
+            <a:ext cx="5791077" cy="2984285"/>
           </a:xfrm>
         </p:spPr>
         <p:txBody>
-          <a:bodyPr/>
+          <a:bodyPr>
+            <a:normAutofit/>
+          </a:bodyPr>
           <a:lstStyle/>
           <a:p>
             <a:pPr>
@@ -9495,15 +10185,15 @@
               <a:buChar char="•"/>
             </a:pPr>
             <a:r>
-              <a:rPr lang="es-GT" dirty="0"/>
-              <a:t>Art </a:t>
-            </a:r>
-            <a:r>
-              <a:rPr lang="es-GT" dirty="0" err="1"/>
+              <a:rPr lang="es-GT" sz="2800" dirty="0"/>
+              <a:t>  Art </a:t>
+            </a:r>
+            <a:r>
+              <a:rPr lang="es-GT" sz="2800" dirty="0" err="1"/>
               <a:t>Images</a:t>
             </a:r>
             <a:r>
-              <a:rPr lang="es-GT" dirty="0"/>
+              <a:rPr lang="es-GT" sz="2800" dirty="0"/>
               <a:t> Dataset</a:t>
             </a:r>
           </a:p>
@@ -9513,14 +10203,14 @@
               <a:buChar char="•"/>
             </a:pPr>
             <a:r>
-              <a:rPr lang="es-GT" dirty="0"/>
-              <a:t>Entendimiento y </a:t>
-            </a:r>
-            <a:r>
-              <a:rPr lang="es-GT" dirty="0" err="1"/>
+              <a:rPr lang="es-GT" sz="2800" dirty="0"/>
+              <a:t>  Entendimiento y </a:t>
+            </a:r>
+            <a:r>
+              <a:rPr lang="es-GT" sz="2800" dirty="0" err="1"/>
               <a:t>Pre-procesamiento</a:t>
             </a:r>
-            <a:endParaRPr lang="es-GT" dirty="0"/>
+            <a:endParaRPr lang="es-GT" sz="2800" dirty="0"/>
           </a:p>
           <a:p>
             <a:pPr>
@@ -9528,8 +10218,8 @@
               <a:buChar char="•"/>
             </a:pPr>
             <a:r>
-              <a:rPr lang="es-GT" dirty="0"/>
-              <a:t>Métodos y Resultados</a:t>
+              <a:rPr lang="es-GT" sz="2800" dirty="0"/>
+              <a:t>  Métodos y Resultados</a:t>
             </a:r>
           </a:p>
           <a:p>
@@ -9538,22 +10228,22 @@
               <a:buChar char="•"/>
             </a:pPr>
             <a:r>
-              <a:rPr lang="es-GT" dirty="0"/>
-              <a:t>Recorrido de </a:t>
-            </a:r>
-            <a:r>
-              <a:rPr lang="es-GT" dirty="0" err="1"/>
+              <a:rPr lang="es-GT" sz="2800" dirty="0"/>
+              <a:t>  </a:t>
+            </a:r>
+            <a:r>
+              <a:rPr lang="es-GT" sz="2800" dirty="0" err="1"/>
               <a:t>Feature</a:t>
             </a:r>
             <a:r>
-              <a:rPr lang="es-GT" dirty="0"/>
+              <a:rPr lang="es-GT" sz="2800" dirty="0"/>
               <a:t> </a:t>
             </a:r>
             <a:r>
-              <a:rPr lang="es-GT" dirty="0" err="1"/>
+              <a:rPr lang="es-GT" sz="2800" dirty="0" err="1"/>
               <a:t>Maps</a:t>
             </a:r>
-            <a:endParaRPr lang="es-GT" dirty="0"/>
+            <a:endParaRPr lang="es-GT" sz="2800" dirty="0"/>
           </a:p>
           <a:p>
             <a:pPr>
@@ -9561,13 +10251,58 @@
               <a:buChar char="•"/>
             </a:pPr>
             <a:r>
-              <a:rPr lang="es-GT" dirty="0"/>
-              <a:t>Conclusiones y Recomendaciones</a:t>
-            </a:r>
-            <a:endParaRPr lang="en-US" dirty="0"/>
+              <a:rPr lang="es-GT" sz="2800" dirty="0"/>
+              <a:t>  Conclusiones y Recomendaciones</a:t>
+            </a:r>
+            <a:endParaRPr lang="en-US" sz="2800" dirty="0"/>
           </a:p>
         </p:txBody>
       </p:sp>
+      <p:pic>
+        <p:nvPicPr>
+          <p:cNvPr id="1026" name="Picture 2" descr="7 Visual Building Blocks To The Elements Of Art">
+            <a:extLst>
+              <a:ext uri="{FF2B5EF4-FFF2-40B4-BE49-F238E27FC236}">
+                <a16:creationId xmlns:a16="http://schemas.microsoft.com/office/drawing/2014/main" id="{D7EFBF4E-AA49-4E01-A8D6-36EC62085693}"/>
+              </a:ext>
+            </a:extLst>
+          </p:cNvPr>
+          <p:cNvPicPr>
+            <a:picLocks noChangeAspect="1" noChangeArrowheads="1"/>
+          </p:cNvPicPr>
+          <p:nvPr/>
+        </p:nvPicPr>
+        <p:blipFill rotWithShape="1">
+          <a:blip r:embed="rId2">
+            <a:extLst>
+              <a:ext uri="{28A0092B-C50C-407E-A947-70E740481C1C}">
+                <a14:useLocalDpi xmlns:a14="http://schemas.microsoft.com/office/drawing/2010/main" val="0"/>
+              </a:ext>
+            </a:extLst>
+          </a:blip>
+          <a:srcRect l="21149" r="39201" b="-2"/>
+          <a:stretch/>
+        </p:blipFill>
+        <p:spPr bwMode="auto">
+          <a:xfrm>
+            <a:off x="8114537" y="10"/>
+            <a:ext cx="4077463" cy="6864408"/>
+          </a:xfrm>
+          <a:prstGeom prst="rect">
+            <a:avLst/>
+          </a:prstGeom>
+          <a:noFill/>
+          <a:extLst>
+            <a:ext uri="{909E8E84-426E-40DD-AFC4-6F175D3DCCD1}">
+              <a14:hiddenFill xmlns:a14="http://schemas.microsoft.com/office/drawing/2010/main">
+                <a:solidFill>
+                  <a:srgbClr val="FFFFFF"/>
+                </a:solidFill>
+              </a14:hiddenFill>
+            </a:ext>
+          </a:extLst>
+        </p:spPr>
+      </p:pic>
     </p:spTree>
     <p:extLst>
       <p:ext uri="{BB962C8B-B14F-4D97-AF65-F5344CB8AC3E}">
@@ -9733,8 +10468,8 @@
         </p:nvSpPr>
         <p:spPr>
           <a:xfrm>
-            <a:off x="3080611" y="5922752"/>
-            <a:ext cx="2287452" cy="435715"/>
+            <a:off x="3131660" y="5805255"/>
+            <a:ext cx="2013903" cy="435715"/>
           </a:xfrm>
           <a:prstGeom prst="rect">
             <a:avLst/>
@@ -9963,8 +10698,8 @@
         </p:nvSpPr>
         <p:spPr>
           <a:xfrm>
-            <a:off x="9654895" y="5805255"/>
-            <a:ext cx="2287452" cy="435715"/>
+            <a:off x="9512391" y="5805255"/>
+            <a:ext cx="1163526" cy="435715"/>
           </a:xfrm>
           <a:prstGeom prst="rect">
             <a:avLst/>
@@ -10223,14 +10958,19 @@
             <p:ph type="title"/>
           </p:nvPr>
         </p:nvSpPr>
-        <p:spPr/>
+        <p:spPr>
+          <a:xfrm>
+            <a:off x="657224" y="499533"/>
+            <a:ext cx="10772775" cy="1222389"/>
+          </a:xfrm>
+        </p:spPr>
         <p:txBody>
           <a:bodyPr/>
           <a:lstStyle/>
           <a:p>
             <a:r>
               <a:rPr lang="es-GT" dirty="0"/>
-              <a:t>Conclusiones y Recomendaciones</a:t>
+              <a:t>Conclusiones</a:t>
             </a:r>
             <a:endParaRPr lang="en-US" dirty="0"/>
           </a:p>
@@ -10252,12 +10992,404 @@
             <p:ph idx="1"/>
           </p:nvPr>
         </p:nvSpPr>
-        <p:spPr/>
+        <p:spPr>
+          <a:xfrm>
+            <a:off x="657224" y="1721922"/>
+            <a:ext cx="10753725" cy="4484123"/>
+          </a:xfrm>
+        </p:spPr>
         <p:txBody>
-          <a:bodyPr/>
+          <a:bodyPr>
+            <a:normAutofit lnSpcReduction="10000"/>
+          </a:bodyPr>
           <a:lstStyle/>
           <a:p>
-            <a:endParaRPr lang="en-US"/>
+            <a:pPr>
+              <a:buFont typeface="Arial" panose="020B0604020202020204" pitchFamily="34" charset="0"/>
+              <a:buChar char="•"/>
+            </a:pPr>
+            <a:r>
+              <a:rPr lang="es-GT" dirty="0"/>
+              <a:t>  El balance y tamaño del dataset es importante </a:t>
+            </a:r>
+          </a:p>
+          <a:p>
+            <a:pPr>
+              <a:buFont typeface="Arial" panose="020B0604020202020204" pitchFamily="34" charset="0"/>
+              <a:buChar char="•"/>
+            </a:pPr>
+            <a:r>
+              <a:rPr lang="es-GT" dirty="0"/>
+              <a:t>  La dimensión de una imagen forma parte de los </a:t>
+            </a:r>
+            <a:r>
+              <a:rPr lang="es-GT" dirty="0" err="1"/>
+              <a:t>hiperparámetros</a:t>
+            </a:r>
+            <a:r>
+              <a:rPr lang="es-GT" dirty="0"/>
+              <a:t> </a:t>
+            </a:r>
+            <a:endParaRPr lang="en-US" dirty="0"/>
+          </a:p>
+          <a:p>
+            <a:pPr lvl="2">
+              <a:buFont typeface="Arial" panose="020B0604020202020204" pitchFamily="34" charset="0"/>
+              <a:buChar char="•"/>
+            </a:pPr>
+            <a:r>
+              <a:rPr lang="en-US" dirty="0" err="1"/>
+              <a:t>Velocidad</a:t>
+            </a:r>
+            <a:r>
+              <a:rPr lang="en-US" dirty="0"/>
+              <a:t> vs Accuracy </a:t>
+            </a:r>
+          </a:p>
+          <a:p>
+            <a:pPr lvl="1">
+              <a:buFont typeface="Arial" panose="020B0604020202020204" pitchFamily="34" charset="0"/>
+              <a:buChar char="•"/>
+            </a:pPr>
+            <a:r>
+              <a:rPr lang="en-US" dirty="0"/>
+              <a:t>Las </a:t>
+            </a:r>
+            <a:r>
+              <a:rPr lang="en-US" dirty="0" err="1"/>
+              <a:t>capas</a:t>
+            </a:r>
+            <a:r>
+              <a:rPr lang="en-US" dirty="0"/>
+              <a:t> </a:t>
+            </a:r>
+            <a:r>
+              <a:rPr lang="en-US" dirty="0" err="1"/>
+              <a:t>densas</a:t>
+            </a:r>
+            <a:r>
+              <a:rPr lang="en-US" dirty="0"/>
+              <a:t> son </a:t>
+            </a:r>
+            <a:r>
+              <a:rPr lang="en-US" dirty="0" err="1"/>
+              <a:t>fundamentales</a:t>
+            </a:r>
+            <a:r>
+              <a:rPr lang="en-US" dirty="0"/>
+              <a:t> </a:t>
+            </a:r>
+            <a:r>
+              <a:rPr lang="en-US" dirty="0" err="1"/>
+              <a:t>pero</a:t>
+            </a:r>
+            <a:r>
+              <a:rPr lang="en-US" dirty="0"/>
+              <a:t> se </a:t>
+            </a:r>
+            <a:r>
+              <a:rPr lang="en-US" dirty="0" err="1"/>
+              <a:t>deben</a:t>
+            </a:r>
+            <a:r>
+              <a:rPr lang="en-US" dirty="0"/>
+              <a:t> de </a:t>
+            </a:r>
+            <a:r>
+              <a:rPr lang="en-US" dirty="0" err="1"/>
+              <a:t>configurar</a:t>
+            </a:r>
+            <a:r>
+              <a:rPr lang="en-US" dirty="0"/>
+              <a:t> con </a:t>
+            </a:r>
+            <a:r>
+              <a:rPr lang="en-US" dirty="0" err="1"/>
+              <a:t>precaución</a:t>
+            </a:r>
+            <a:r>
+              <a:rPr lang="en-US" dirty="0"/>
+              <a:t> </a:t>
+            </a:r>
+          </a:p>
+          <a:p>
+            <a:pPr lvl="1">
+              <a:buFont typeface="Arial" panose="020B0604020202020204" pitchFamily="34" charset="0"/>
+              <a:buChar char="•"/>
+            </a:pPr>
+            <a:r>
+              <a:rPr lang="en-US" dirty="0"/>
+              <a:t>El </a:t>
+            </a:r>
+            <a:r>
+              <a:rPr lang="en-US" dirty="0" err="1"/>
+              <a:t>dato</a:t>
+            </a:r>
+            <a:r>
+              <a:rPr lang="en-US" dirty="0"/>
+              <a:t> de loss se </a:t>
+            </a:r>
+            <a:r>
+              <a:rPr lang="en-US" dirty="0" err="1"/>
+              <a:t>puede</a:t>
+            </a:r>
+            <a:r>
+              <a:rPr lang="en-US" dirty="0"/>
+              <a:t> </a:t>
+            </a:r>
+            <a:r>
+              <a:rPr lang="en-US" dirty="0" err="1"/>
+              <a:t>monitorear</a:t>
+            </a:r>
+            <a:r>
+              <a:rPr lang="en-US" dirty="0"/>
+              <a:t> para </a:t>
+            </a:r>
+            <a:r>
+              <a:rPr lang="en-US" dirty="0" err="1"/>
+              <a:t>identificar</a:t>
+            </a:r>
+            <a:r>
+              <a:rPr lang="en-US" dirty="0"/>
+              <a:t> overfitting </a:t>
+            </a:r>
+          </a:p>
+          <a:p>
+            <a:pPr lvl="1">
+              <a:buFont typeface="Arial" panose="020B0604020202020204" pitchFamily="34" charset="0"/>
+              <a:buChar char="•"/>
+            </a:pPr>
+            <a:endParaRPr lang="en-US" dirty="0"/>
+          </a:p>
+          <a:p>
+            <a:pPr lvl="1">
+              <a:buFont typeface="Arial" panose="020B0604020202020204" pitchFamily="34" charset="0"/>
+              <a:buChar char="•"/>
+            </a:pPr>
+            <a:endParaRPr lang="en-US" dirty="0"/>
+          </a:p>
+          <a:p>
+            <a:pPr lvl="1">
+              <a:buFont typeface="Arial" panose="020B0604020202020204" pitchFamily="34" charset="0"/>
+              <a:buChar char="•"/>
+            </a:pPr>
+            <a:r>
+              <a:rPr lang="en-US" dirty="0" err="1"/>
+              <a:t>Dificultad</a:t>
+            </a:r>
+            <a:r>
+              <a:rPr lang="en-US" dirty="0"/>
+              <a:t> </a:t>
+            </a:r>
+            <a:r>
+              <a:rPr lang="en-US" dirty="0" err="1"/>
+              <a:t>en</a:t>
+            </a:r>
+            <a:r>
+              <a:rPr lang="en-US" dirty="0"/>
+              <a:t> la </a:t>
+            </a:r>
+            <a:r>
+              <a:rPr lang="en-US" dirty="0" err="1"/>
+              <a:t>diferenciación</a:t>
+            </a:r>
+            <a:r>
+              <a:rPr lang="en-US" dirty="0"/>
+              <a:t> entre pinturas y </a:t>
+            </a:r>
+            <a:r>
+              <a:rPr lang="en-US" dirty="0" err="1"/>
+              <a:t>esculturas</a:t>
+            </a:r>
+            <a:r>
+              <a:rPr lang="en-US" dirty="0"/>
+              <a:t> </a:t>
+            </a:r>
+          </a:p>
+          <a:p>
+            <a:pPr lvl="1">
+              <a:buFont typeface="Arial" panose="020B0604020202020204" pitchFamily="34" charset="0"/>
+              <a:buChar char="•"/>
+            </a:pPr>
+            <a:r>
+              <a:rPr lang="en-US" dirty="0"/>
+              <a:t>Feature maps se </a:t>
+            </a:r>
+            <a:r>
+              <a:rPr lang="en-US" dirty="0" err="1"/>
+              <a:t>vuelven</a:t>
+            </a:r>
+            <a:r>
+              <a:rPr lang="en-US" dirty="0"/>
+              <a:t> </a:t>
+            </a:r>
+            <a:r>
+              <a:rPr lang="en-US" dirty="0" err="1"/>
+              <a:t>abstractos</a:t>
+            </a:r>
+            <a:r>
+              <a:rPr lang="en-US" dirty="0"/>
+              <a:t> </a:t>
+            </a:r>
+            <a:r>
+              <a:rPr lang="en-US" dirty="0" err="1"/>
+              <a:t>visualmente</a:t>
+            </a:r>
+            <a:r>
+              <a:rPr lang="en-US" dirty="0"/>
+              <a:t> </a:t>
+            </a:r>
+            <a:r>
+              <a:rPr lang="en-US" dirty="0" err="1"/>
+              <a:t>pero</a:t>
+            </a:r>
+            <a:r>
+              <a:rPr lang="en-US" dirty="0"/>
+              <a:t> son </a:t>
+            </a:r>
+            <a:r>
+              <a:rPr lang="en-US" dirty="0" err="1"/>
+              <a:t>más</a:t>
+            </a:r>
+            <a:r>
+              <a:rPr lang="en-US" dirty="0"/>
+              <a:t> </a:t>
+            </a:r>
+            <a:r>
+              <a:rPr lang="en-US" dirty="0" err="1"/>
+              <a:t>específicos</a:t>
+            </a:r>
+            <a:endParaRPr lang="en-US" dirty="0"/>
+          </a:p>
+          <a:p>
+            <a:pPr lvl="1">
+              <a:buFont typeface="Arial" panose="020B0604020202020204" pitchFamily="34" charset="0"/>
+              <a:buChar char="•"/>
+            </a:pPr>
+            <a:r>
+              <a:rPr lang="en-US" dirty="0"/>
+              <a:t>Pintura, </a:t>
+            </a:r>
+            <a:r>
+              <a:rPr lang="en-US" dirty="0" err="1"/>
+              <a:t>enfoque</a:t>
+            </a:r>
+            <a:r>
+              <a:rPr lang="en-US" dirty="0"/>
+              <a:t> </a:t>
+            </a:r>
+            <a:r>
+              <a:rPr lang="en-US" dirty="0" err="1"/>
+              <a:t>en</a:t>
+            </a:r>
+            <a:r>
+              <a:rPr lang="en-US" dirty="0"/>
+              <a:t> </a:t>
+            </a:r>
+            <a:r>
+              <a:rPr lang="en-US" dirty="0" err="1"/>
+              <a:t>características</a:t>
+            </a:r>
+            <a:r>
+              <a:rPr lang="en-US" dirty="0"/>
+              <a:t> </a:t>
+            </a:r>
+            <a:r>
+              <a:rPr lang="en-US" dirty="0" err="1"/>
+              <a:t>humanas</a:t>
+            </a:r>
+            <a:r>
+              <a:rPr lang="en-US" dirty="0"/>
+              <a:t> </a:t>
+            </a:r>
+          </a:p>
+          <a:p>
+            <a:pPr lvl="1">
+              <a:buFont typeface="Arial" panose="020B0604020202020204" pitchFamily="34" charset="0"/>
+              <a:buChar char="•"/>
+            </a:pPr>
+            <a:r>
+              <a:rPr lang="en-US" dirty="0" err="1"/>
+              <a:t>Esculturas</a:t>
+            </a:r>
+            <a:r>
+              <a:rPr lang="en-US" dirty="0"/>
+              <a:t>, </a:t>
+            </a:r>
+            <a:r>
+              <a:rPr lang="en-US" dirty="0" err="1"/>
+              <a:t>enfoque</a:t>
+            </a:r>
+            <a:r>
+              <a:rPr lang="en-US" dirty="0"/>
+              <a:t> </a:t>
+            </a:r>
+            <a:r>
+              <a:rPr lang="en-US" dirty="0" err="1"/>
+              <a:t>en</a:t>
+            </a:r>
+            <a:r>
+              <a:rPr lang="en-US" dirty="0"/>
+              <a:t> </a:t>
+            </a:r>
+            <a:r>
+              <a:rPr lang="en-US" dirty="0" err="1"/>
+              <a:t>ambiente</a:t>
+            </a:r>
+            <a:r>
+              <a:rPr lang="en-US" dirty="0"/>
+              <a:t> </a:t>
+            </a:r>
+          </a:p>
+          <a:p>
+            <a:pPr lvl="1">
+              <a:buFont typeface="Arial" panose="020B0604020202020204" pitchFamily="34" charset="0"/>
+              <a:buChar char="•"/>
+            </a:pPr>
+            <a:r>
+              <a:rPr lang="en-US" dirty="0" err="1"/>
+              <a:t>Iconografía</a:t>
+            </a:r>
+            <a:r>
+              <a:rPr lang="en-US" dirty="0"/>
+              <a:t>, </a:t>
+            </a:r>
+            <a:r>
+              <a:rPr lang="en-US" dirty="0" err="1"/>
+              <a:t>enfoque</a:t>
+            </a:r>
+            <a:r>
+              <a:rPr lang="en-US" dirty="0"/>
+              <a:t> </a:t>
+            </a:r>
+            <a:r>
+              <a:rPr lang="en-US" dirty="0" err="1"/>
+              <a:t>en</a:t>
+            </a:r>
+            <a:r>
+              <a:rPr lang="en-US" dirty="0"/>
+              <a:t> </a:t>
+            </a:r>
+            <a:r>
+              <a:rPr lang="en-US" dirty="0" err="1"/>
+              <a:t>detalles</a:t>
+            </a:r>
+            <a:r>
+              <a:rPr lang="en-US" dirty="0"/>
+              <a:t> </a:t>
+            </a:r>
+            <a:r>
+              <a:rPr lang="en-US" dirty="0" err="1"/>
+              <a:t>decorativos</a:t>
+            </a:r>
+            <a:endParaRPr lang="en-US" dirty="0"/>
+          </a:p>
+          <a:p>
+            <a:pPr lvl="1">
+              <a:buFont typeface="Arial" panose="020B0604020202020204" pitchFamily="34" charset="0"/>
+              <a:buChar char="•"/>
+            </a:pPr>
+            <a:endParaRPr lang="en-US" dirty="0"/>
           </a:p>
         </p:txBody>
       </p:sp>
@@ -10265,6 +11397,252 @@
     <p:extLst>
       <p:ext uri="{BB962C8B-B14F-4D97-AF65-F5344CB8AC3E}">
         <p14:creationId xmlns:p14="http://schemas.microsoft.com/office/powerpoint/2010/main" val="969627334"/>
+      </p:ext>
+    </p:extLst>
+  </p:cSld>
+  <p:clrMapOvr>
+    <a:masterClrMapping/>
+  </p:clrMapOvr>
+</p:sld>
+</file>
+
+<file path=ppt/slides/slide22.xml><?xml version="1.0" encoding="utf-8"?>
+<p:sld xmlns:a="http://schemas.openxmlformats.org/drawingml/2006/main" xmlns:r="http://schemas.openxmlformats.org/officeDocument/2006/relationships" xmlns:p="http://schemas.openxmlformats.org/presentationml/2006/main">
+  <p:cSld>
+    <p:bg>
+      <p:bgPr>
+        <a:solidFill>
+          <a:schemeClr val="bg1"/>
+        </a:solidFill>
+        <a:effectLst/>
+      </p:bgPr>
+    </p:bg>
+    <p:spTree>
+      <p:nvGrpSpPr>
+        <p:cNvPr id="1" name=""/>
+        <p:cNvGrpSpPr/>
+        <p:nvPr/>
+      </p:nvGrpSpPr>
+      <p:grpSpPr>
+        <a:xfrm>
+          <a:off x="0" y="0"/>
+          <a:ext cx="0" cy="0"/>
+          <a:chOff x="0" y="0"/>
+          <a:chExt cx="0" cy="0"/>
+        </a:xfrm>
+      </p:grpSpPr>
+      <p:sp>
+        <p:nvSpPr>
+          <p:cNvPr id="2" name="Title 1">
+            <a:extLst>
+              <a:ext uri="{FF2B5EF4-FFF2-40B4-BE49-F238E27FC236}">
+                <a16:creationId xmlns:a16="http://schemas.microsoft.com/office/drawing/2014/main" id="{E6331B13-3143-46BE-ACA3-4787F6FF850E}"/>
+              </a:ext>
+            </a:extLst>
+          </p:cNvPr>
+          <p:cNvSpPr>
+            <a:spLocks noGrp="1"/>
+          </p:cNvSpPr>
+          <p:nvPr>
+            <p:ph type="title"/>
+          </p:nvPr>
+        </p:nvSpPr>
+        <p:spPr>
+          <a:xfrm>
+            <a:off x="657225" y="499533"/>
+            <a:ext cx="7115176" cy="1658198"/>
+          </a:xfrm>
+        </p:spPr>
+        <p:txBody>
+          <a:bodyPr>
+            <a:normAutofit/>
+          </a:bodyPr>
+          <a:lstStyle/>
+          <a:p>
+            <a:r>
+              <a:rPr lang="es-GT">
+                <a:solidFill>
+                  <a:srgbClr val="343987"/>
+                </a:solidFill>
+              </a:rPr>
+              <a:t>Recomendaciones</a:t>
+            </a:r>
+            <a:endParaRPr lang="en-US">
+              <a:solidFill>
+                <a:srgbClr val="343987"/>
+              </a:solidFill>
+            </a:endParaRPr>
+          </a:p>
+        </p:txBody>
+      </p:sp>
+      <p:sp>
+        <p:nvSpPr>
+          <p:cNvPr id="3" name="Content Placeholder 2">
+            <a:extLst>
+              <a:ext uri="{FF2B5EF4-FFF2-40B4-BE49-F238E27FC236}">
+                <a16:creationId xmlns:a16="http://schemas.microsoft.com/office/drawing/2014/main" id="{68681059-C3D2-4A31-A295-BCC404D0185A}"/>
+              </a:ext>
+            </a:extLst>
+          </p:cNvPr>
+          <p:cNvSpPr>
+            <a:spLocks noGrp="1"/>
+          </p:cNvSpPr>
+          <p:nvPr>
+            <p:ph idx="1"/>
+          </p:nvPr>
+        </p:nvSpPr>
+        <p:spPr>
+          <a:xfrm>
+            <a:off x="676656" y="2011680"/>
+            <a:ext cx="6877083" cy="3766185"/>
+          </a:xfrm>
+        </p:spPr>
+        <p:txBody>
+          <a:bodyPr>
+            <a:normAutofit/>
+          </a:bodyPr>
+          <a:lstStyle/>
+          <a:p>
+            <a:pPr>
+              <a:buFont typeface="Arial" panose="020B0604020202020204" pitchFamily="34" charset="0"/>
+              <a:buChar char="•"/>
+            </a:pPr>
+            <a:r>
+              <a:rPr lang="es-GT" dirty="0"/>
+              <a:t>  Agregar más imágenes al dataset </a:t>
+            </a:r>
+          </a:p>
+          <a:p>
+            <a:pPr lvl="2">
+              <a:buFont typeface="Arial" panose="020B0604020202020204" pitchFamily="34" charset="0"/>
+              <a:buChar char="•"/>
+            </a:pPr>
+            <a:r>
+              <a:rPr lang="es-GT" dirty="0"/>
+              <a:t>Mayor número de categorías </a:t>
+            </a:r>
+          </a:p>
+          <a:p>
+            <a:pPr lvl="2">
+              <a:buFont typeface="Arial" panose="020B0604020202020204" pitchFamily="34" charset="0"/>
+              <a:buChar char="•"/>
+            </a:pPr>
+            <a:r>
+              <a:rPr lang="es-GT" dirty="0"/>
+              <a:t>Diferenciación concreta entre categorías</a:t>
+            </a:r>
+          </a:p>
+          <a:p>
+            <a:pPr>
+              <a:buFont typeface="Arial" panose="020B0604020202020204" pitchFamily="34" charset="0"/>
+              <a:buChar char="•"/>
+            </a:pPr>
+            <a:r>
+              <a:rPr lang="es-GT" dirty="0"/>
+              <a:t>  Evaluar los beneficios de aumentar el dataset artificialmente </a:t>
+            </a:r>
+          </a:p>
+          <a:p>
+            <a:pPr>
+              <a:buFont typeface="Arial" panose="020B0604020202020204" pitchFamily="34" charset="0"/>
+              <a:buChar char="•"/>
+            </a:pPr>
+            <a:r>
+              <a:rPr lang="es-GT" dirty="0"/>
+              <a:t>  Visualizar </a:t>
+            </a:r>
+            <a:r>
+              <a:rPr lang="es-GT" dirty="0" err="1"/>
+              <a:t>feature</a:t>
+            </a:r>
+            <a:r>
+              <a:rPr lang="es-GT" dirty="0"/>
+              <a:t> </a:t>
+            </a:r>
+            <a:r>
+              <a:rPr lang="es-GT" dirty="0" err="1"/>
+              <a:t>maps</a:t>
+            </a:r>
+            <a:r>
+              <a:rPr lang="es-GT" dirty="0"/>
+              <a:t> de mayor dimensionalidad</a:t>
+            </a:r>
+          </a:p>
+          <a:p>
+            <a:pPr>
+              <a:buFont typeface="Arial" panose="020B0604020202020204" pitchFamily="34" charset="0"/>
+              <a:buChar char="•"/>
+            </a:pPr>
+            <a:r>
+              <a:rPr lang="es-GT" dirty="0"/>
+              <a:t>  Análisis por período histórico</a:t>
+            </a:r>
+          </a:p>
+          <a:p>
+            <a:pPr>
+              <a:buFont typeface="Arial" panose="020B0604020202020204" pitchFamily="34" charset="0"/>
+              <a:buChar char="•"/>
+            </a:pPr>
+            <a:endParaRPr lang="es-GT" dirty="0"/>
+          </a:p>
+          <a:p>
+            <a:pPr>
+              <a:buFont typeface="Arial" panose="020B0604020202020204" pitchFamily="34" charset="0"/>
+              <a:buChar char="•"/>
+            </a:pPr>
+            <a:endParaRPr lang="en-US" dirty="0"/>
+          </a:p>
+        </p:txBody>
+      </p:sp>
+      <p:pic>
+        <p:nvPicPr>
+          <p:cNvPr id="3074" name="Picture 2" descr="Arte Contemporáneo: características y clasificación">
+            <a:extLst>
+              <a:ext uri="{FF2B5EF4-FFF2-40B4-BE49-F238E27FC236}">
+                <a16:creationId xmlns:a16="http://schemas.microsoft.com/office/drawing/2014/main" id="{151B2F61-EB89-46C7-9547-E7751F3A0B01}"/>
+              </a:ext>
+            </a:extLst>
+          </p:cNvPr>
+          <p:cNvPicPr>
+            <a:picLocks noChangeAspect="1" noChangeArrowheads="1"/>
+          </p:cNvPicPr>
+          <p:nvPr/>
+        </p:nvPicPr>
+        <p:blipFill rotWithShape="1">
+          <a:blip r:embed="rId2">
+            <a:extLst>
+              <a:ext uri="{28A0092B-C50C-407E-A947-70E740481C1C}">
+                <a14:useLocalDpi xmlns:a14="http://schemas.microsoft.com/office/drawing/2010/main" val="0"/>
+              </a:ext>
+            </a:extLst>
+          </a:blip>
+          <a:srcRect l="27606" r="41803" b="-1"/>
+          <a:stretch/>
+        </p:blipFill>
+        <p:spPr bwMode="auto">
+          <a:xfrm>
+            <a:off x="8114537" y="10"/>
+            <a:ext cx="4077463" cy="6864408"/>
+          </a:xfrm>
+          <a:prstGeom prst="rect">
+            <a:avLst/>
+          </a:prstGeom>
+          <a:noFill/>
+          <a:extLst>
+            <a:ext uri="{909E8E84-426E-40DD-AFC4-6F175D3DCCD1}">
+              <a14:hiddenFill xmlns:a14="http://schemas.microsoft.com/office/drawing/2010/main">
+                <a:solidFill>
+                  <a:srgbClr val="FFFFFF"/>
+                </a:solidFill>
+              </a14:hiddenFill>
+            </a:ext>
+          </a:extLst>
+        </p:spPr>
+      </p:pic>
+    </p:spTree>
+    <p:extLst>
+      <p:ext uri="{BB962C8B-B14F-4D97-AF65-F5344CB8AC3E}">
+        <p14:creationId xmlns:p14="http://schemas.microsoft.com/office/powerpoint/2010/main" val="564495082"/>
       </p:ext>
     </p:extLst>
   </p:cSld>
@@ -10307,7 +11685,12 @@
             <p:ph type="title"/>
           </p:nvPr>
         </p:nvSpPr>
-        <p:spPr/>
+        <p:spPr>
+          <a:xfrm>
+            <a:off x="657224" y="499533"/>
+            <a:ext cx="10772775" cy="1127386"/>
+          </a:xfrm>
+        </p:spPr>
         <p:txBody>
           <a:bodyPr/>
           <a:lstStyle/>
@@ -10350,9 +11733,13 @@
           <a:bodyPr/>
           <a:lstStyle/>
           <a:p>
+            <a:pPr>
+              <a:buFont typeface="Arial" panose="020B0604020202020204" pitchFamily="34" charset="0"/>
+              <a:buChar char="•"/>
+            </a:pPr>
             <a:r>
               <a:rPr lang="es-GT" dirty="0"/>
-              <a:t>Imágenes de arte obtenidas de Google </a:t>
+              <a:t>  Imágenes de arte obtenidas de Google </a:t>
             </a:r>
             <a:r>
               <a:rPr lang="es-GT" dirty="0" err="1"/>
@@ -10380,9 +11767,13 @@
             </a:r>
           </a:p>
           <a:p>
+            <a:pPr>
+              <a:buFont typeface="Arial" panose="020B0604020202020204" pitchFamily="34" charset="0"/>
+              <a:buChar char="•"/>
+            </a:pPr>
             <a:r>
               <a:rPr lang="es-GT" dirty="0"/>
-              <a:t>Total de 8,685</a:t>
+              <a:t>  Total de 8,685</a:t>
             </a:r>
           </a:p>
         </p:txBody>
@@ -10822,7 +12213,12 @@
             <p:ph idx="1"/>
           </p:nvPr>
         </p:nvSpPr>
-        <p:spPr/>
+        <p:spPr>
+          <a:xfrm>
+            <a:off x="676656" y="2011681"/>
+            <a:ext cx="10753725" cy="2247796"/>
+          </a:xfrm>
+        </p:spPr>
         <p:txBody>
           <a:bodyPr/>
           <a:lstStyle/>
@@ -10832,10 +12228,10 @@
               <a:buChar char="•"/>
             </a:pPr>
             <a:r>
-              <a:rPr lang="es-GT" dirty="0"/>
-              <a:t>Dataset inicialmente en estructura de directorios </a:t>
-            </a:r>
-            <a:endParaRPr lang="en-US" dirty="0"/>
+              <a:rPr lang="es-GT" sz="2800" dirty="0"/>
+              <a:t>  Estructura inicial en base a directorios</a:t>
+            </a:r>
+            <a:endParaRPr lang="en-US" sz="2800" dirty="0"/>
           </a:p>
           <a:p>
             <a:pPr>
@@ -10843,27 +12239,31 @@
               <a:buChar char="•"/>
             </a:pPr>
             <a:r>
-              <a:rPr lang="en-US" dirty="0" err="1"/>
+              <a:rPr lang="en-US" sz="2800" dirty="0"/>
+              <a:t>  </a:t>
+            </a:r>
+            <a:r>
+              <a:rPr lang="en-US" sz="2800" dirty="0" err="1"/>
               <a:t>Formato</a:t>
             </a:r>
             <a:r>
-              <a:rPr lang="en-US" dirty="0"/>
+              <a:rPr lang="en-US" sz="2800" dirty="0"/>
               <a:t> de </a:t>
             </a:r>
             <a:r>
-              <a:rPr lang="en-US" dirty="0" err="1"/>
+              <a:rPr lang="en-US" sz="2800" dirty="0" err="1"/>
               <a:t>imágenes</a:t>
             </a:r>
             <a:r>
-              <a:rPr lang="en-US" dirty="0"/>
+              <a:rPr lang="en-US" sz="2800" dirty="0"/>
               <a:t> </a:t>
             </a:r>
             <a:r>
-              <a:rPr lang="en-US" dirty="0" err="1"/>
+              <a:rPr lang="en-US" sz="2800" dirty="0" err="1"/>
               <a:t>consistente</a:t>
             </a:r>
             <a:r>
-              <a:rPr lang="en-US" dirty="0"/>
+              <a:rPr lang="en-US" sz="2800" dirty="0"/>
               <a:t> </a:t>
             </a:r>
           </a:p>
@@ -10873,14 +12273,14 @@
               <a:buChar char="•"/>
             </a:pPr>
             <a:r>
-              <a:rPr lang="en-US" dirty="0"/>
-              <a:t>Inputs a color, 3 </a:t>
-            </a:r>
-            <a:r>
-              <a:rPr lang="en-US" dirty="0" err="1"/>
+              <a:rPr lang="en-US" sz="2800" dirty="0"/>
+              <a:t>  Inputs a color, 3 </a:t>
+            </a:r>
+            <a:r>
+              <a:rPr lang="en-US" sz="2800" dirty="0" err="1"/>
               <a:t>canales</a:t>
             </a:r>
-            <a:endParaRPr lang="en-US" dirty="0"/>
+            <a:endParaRPr lang="en-US" sz="2800" dirty="0"/>
           </a:p>
           <a:p>
             <a:pPr>
@@ -10888,19 +12288,23 @@
               <a:buChar char="•"/>
             </a:pPr>
             <a:r>
-              <a:rPr lang="en-US" dirty="0" err="1"/>
+              <a:rPr lang="en-US" sz="2800" dirty="0"/>
+              <a:t>  </a:t>
+            </a:r>
+            <a:r>
+              <a:rPr lang="en-US" sz="2800" dirty="0" err="1"/>
               <a:t>Tamaño</a:t>
             </a:r>
             <a:r>
-              <a:rPr lang="en-US" dirty="0"/>
+              <a:rPr lang="en-US" sz="2800" dirty="0"/>
               <a:t> de </a:t>
             </a:r>
             <a:r>
-              <a:rPr lang="en-US" dirty="0" err="1"/>
+              <a:rPr lang="en-US" sz="2800" dirty="0" err="1"/>
               <a:t>imágenes</a:t>
             </a:r>
             <a:r>
-              <a:rPr lang="en-US" dirty="0"/>
+              <a:rPr lang="en-US" sz="2800" dirty="0"/>
               <a:t> variable</a:t>
             </a:r>
           </a:p>
@@ -10923,8 +12327,8 @@
         </p:nvSpPr>
         <p:spPr>
           <a:xfrm>
-            <a:off x="1333697" y="4880171"/>
-            <a:ext cx="1005037" cy="738664"/>
+            <a:off x="1919117" y="4892735"/>
+            <a:ext cx="1431380" cy="1015663"/>
           </a:xfrm>
           <a:prstGeom prst="rect">
             <a:avLst/>
@@ -10937,25 +12341,28 @@
           </a:bodyPr>
           <a:lstStyle/>
           <a:p>
-            <a:r>
-              <a:rPr lang="en-US" sz="1400" dirty="0"/>
-              <a:t>100 pix</a:t>
-            </a:r>
-            <a:r>
-              <a:rPr lang="es-GT" sz="1400" dirty="0" err="1"/>
-              <a:t>éles</a:t>
-            </a:r>
-            <a:endParaRPr lang="es-GT" sz="1400" dirty="0"/>
-          </a:p>
-          <a:p>
-            <a:endParaRPr lang="es-GT" sz="1400" dirty="0"/>
-          </a:p>
-          <a:p>
-            <a:r>
-              <a:rPr lang="es-GT" sz="1400" dirty="0"/>
+            <a:pPr algn="ctr"/>
+            <a:r>
+              <a:rPr lang="en-US" sz="2000" dirty="0"/>
+              <a:t>100 p</a:t>
+            </a:r>
+            <a:r>
+              <a:rPr lang="es-GT" sz="2000" dirty="0" err="1"/>
+              <a:t>íxeles</a:t>
+            </a:r>
+            <a:endParaRPr lang="es-GT" sz="2000" dirty="0"/>
+          </a:p>
+          <a:p>
+            <a:pPr algn="ctr"/>
+            <a:endParaRPr lang="es-GT" sz="2000" dirty="0"/>
+          </a:p>
+          <a:p>
+            <a:pPr algn="ctr"/>
+            <a:r>
+              <a:rPr lang="es-GT" sz="2000" dirty="0"/>
               <a:t>(10,10,3)</a:t>
             </a:r>
-            <a:endParaRPr lang="en-US" sz="1400" dirty="0"/>
+            <a:endParaRPr lang="en-US" sz="2000" dirty="0"/>
           </a:p>
         </p:txBody>
       </p:sp>
@@ -10973,8 +12380,8 @@
         </p:nvSpPr>
         <p:spPr>
           <a:xfrm>
-            <a:off x="8454029" y="4259477"/>
-            <a:ext cx="3061315" cy="1938992"/>
+            <a:off x="7133508" y="4532827"/>
+            <a:ext cx="3061315" cy="1569660"/>
           </a:xfrm>
           <a:prstGeom prst="rect">
             <a:avLst/>
@@ -10987,25 +12394,31 @@
           </a:bodyPr>
           <a:lstStyle/>
           <a:p>
-            <a:r>
-              <a:rPr lang="en-US" sz="4000" dirty="0"/>
-              <a:t>3M pix</a:t>
-            </a:r>
-            <a:r>
-              <a:rPr lang="es-GT" sz="4000" dirty="0" err="1"/>
-              <a:t>éles</a:t>
-            </a:r>
-            <a:endParaRPr lang="es-GT" sz="4000" dirty="0"/>
-          </a:p>
-          <a:p>
-            <a:endParaRPr lang="es-GT" sz="4000" dirty="0"/>
-          </a:p>
-          <a:p>
-            <a:r>
-              <a:rPr lang="es-GT" sz="4000" dirty="0"/>
+            <a:pPr algn="ctr"/>
+            <a:r>
+              <a:rPr lang="en-US" sz="3200" dirty="0"/>
+              <a:t>3M </a:t>
+            </a:r>
+            <a:r>
+              <a:rPr lang="en-US" sz="3200" dirty="0" err="1"/>
+              <a:t>píxe</a:t>
+            </a:r>
+            <a:r>
+              <a:rPr lang="es-GT" sz="3200" dirty="0"/>
+              <a:t>les</a:t>
+            </a:r>
+          </a:p>
+          <a:p>
+            <a:pPr algn="ctr"/>
+            <a:endParaRPr lang="es-GT" sz="3200" dirty="0"/>
+          </a:p>
+          <a:p>
+            <a:pPr algn="ctr"/>
+            <a:r>
+              <a:rPr lang="es-GT" sz="3200" dirty="0"/>
               <a:t>(1700,1700,3)</a:t>
             </a:r>
-            <a:endParaRPr lang="en-US" sz="4000" dirty="0"/>
+            <a:endParaRPr lang="en-US" sz="3200" dirty="0"/>
           </a:p>
         </p:txBody>
       </p:sp>
@@ -11023,7 +12436,7 @@
         </p:nvSpPr>
         <p:spPr>
           <a:xfrm>
-            <a:off x="4552263" y="4628808"/>
+            <a:off x="4397884" y="4800402"/>
             <a:ext cx="1688237" cy="1200329"/>
           </a:xfrm>
           <a:prstGeom prst="rect">
@@ -11037,20 +12450,26 @@
           </a:bodyPr>
           <a:lstStyle/>
           <a:p>
+            <a:pPr algn="ctr"/>
             <a:r>
               <a:rPr lang="en-US" sz="2400" dirty="0"/>
-              <a:t>140k pix</a:t>
-            </a:r>
-            <a:r>
-              <a:rPr lang="es-GT" sz="2400" dirty="0" err="1"/>
-              <a:t>éles</a:t>
-            </a:r>
+              <a:t>140k </a:t>
+            </a:r>
+            <a:r>
+              <a:rPr lang="en-US" sz="2400" dirty="0" err="1"/>
+              <a:t>píxe</a:t>
+            </a:r>
+            <a:r>
+              <a:rPr lang="es-GT" sz="2400" dirty="0"/>
+              <a:t>les</a:t>
+            </a:r>
+          </a:p>
+          <a:p>
+            <a:pPr algn="ctr"/>
             <a:endParaRPr lang="es-GT" sz="2400" dirty="0"/>
           </a:p>
           <a:p>
-            <a:endParaRPr lang="es-GT" sz="2400" dirty="0"/>
-          </a:p>
-          <a:p>
+            <a:pPr algn="ctr"/>
             <a:r>
               <a:rPr lang="es-GT" sz="2400" dirty="0"/>
               <a:t>(370,370,3)</a:t>
@@ -11061,10 +12480,10 @@
       </p:sp>
       <p:cxnSp>
         <p:nvCxnSpPr>
-          <p:cNvPr id="9" name="Straight Connector 8">
+          <p:cNvPr id="15" name="Straight Arrow Connector 14">
             <a:extLst>
               <a:ext uri="{FF2B5EF4-FFF2-40B4-BE49-F238E27FC236}">
-                <a16:creationId xmlns:a16="http://schemas.microsoft.com/office/drawing/2014/main" id="{43A6DD7A-1132-42A5-9D79-B5409FDEC266}"/>
+                <a16:creationId xmlns:a16="http://schemas.microsoft.com/office/drawing/2014/main" id="{D9ABBCB3-5636-4D4E-AFAD-A8D9A252C442}"/>
               </a:ext>
             </a:extLst>
           </p:cNvPr>
@@ -11073,210 +12492,25 @@
         </p:nvCxnSpPr>
         <p:spPr>
           <a:xfrm>
-            <a:off x="1038687" y="5829137"/>
-            <a:ext cx="1482571" cy="0"/>
+            <a:off x="1828800" y="6358467"/>
+            <a:ext cx="8324603" cy="0"/>
           </a:xfrm>
-          <a:prstGeom prst="line">
+          <a:prstGeom prst="straightConnector1">
             <a:avLst/>
           </a:prstGeom>
+          <a:ln>
+            <a:tailEnd type="triangle"/>
+          </a:ln>
         </p:spPr>
         <p:style>
           <a:lnRef idx="3">
-            <a:schemeClr val="dk1"/>
+            <a:schemeClr val="accent1"/>
           </a:lnRef>
           <a:fillRef idx="0">
-            <a:schemeClr val="dk1"/>
+            <a:schemeClr val="accent1"/>
           </a:fillRef>
           <a:effectRef idx="2">
-            <a:schemeClr val="dk1"/>
-          </a:effectRef>
-          <a:fontRef idx="minor">
-            <a:schemeClr val="tx1"/>
-          </a:fontRef>
-        </p:style>
-      </p:cxnSp>
-      <p:cxnSp>
-        <p:nvCxnSpPr>
-          <p:cNvPr id="10" name="Straight Connector 9">
-            <a:extLst>
-              <a:ext uri="{FF2B5EF4-FFF2-40B4-BE49-F238E27FC236}">
-                <a16:creationId xmlns:a16="http://schemas.microsoft.com/office/drawing/2014/main" id="{AA34A8FE-196D-4E75-84A0-8094E3BC7E13}"/>
-              </a:ext>
-            </a:extLst>
-          </p:cNvPr>
-          <p:cNvCxnSpPr/>
-          <p:nvPr/>
-        </p:nvCxnSpPr>
-        <p:spPr>
-          <a:xfrm>
-            <a:off x="1038686" y="4756418"/>
-            <a:ext cx="1482571" cy="0"/>
-          </a:xfrm>
-          <a:prstGeom prst="line">
-            <a:avLst/>
-          </a:prstGeom>
-        </p:spPr>
-        <p:style>
-          <a:lnRef idx="3">
-            <a:schemeClr val="dk1"/>
-          </a:lnRef>
-          <a:fillRef idx="0">
-            <a:schemeClr val="dk1"/>
-          </a:fillRef>
-          <a:effectRef idx="2">
-            <a:schemeClr val="dk1"/>
-          </a:effectRef>
-          <a:fontRef idx="minor">
-            <a:schemeClr val="tx1"/>
-          </a:fontRef>
-        </p:style>
-      </p:cxnSp>
-      <p:cxnSp>
-        <p:nvCxnSpPr>
-          <p:cNvPr id="11" name="Straight Connector 10">
-            <a:extLst>
-              <a:ext uri="{FF2B5EF4-FFF2-40B4-BE49-F238E27FC236}">
-                <a16:creationId xmlns:a16="http://schemas.microsoft.com/office/drawing/2014/main" id="{CCA179AE-0447-40A5-BFF1-E15371198A0B}"/>
-              </a:ext>
-            </a:extLst>
-          </p:cNvPr>
-          <p:cNvCxnSpPr>
-            <a:cxnSpLocks/>
-          </p:cNvCxnSpPr>
-          <p:nvPr/>
-        </p:nvCxnSpPr>
-        <p:spPr>
-          <a:xfrm>
-            <a:off x="4305906" y="4553712"/>
-            <a:ext cx="2165915" cy="0"/>
-          </a:xfrm>
-          <a:prstGeom prst="line">
-            <a:avLst/>
-          </a:prstGeom>
-        </p:spPr>
-        <p:style>
-          <a:lnRef idx="3">
-            <a:schemeClr val="dk1"/>
-          </a:lnRef>
-          <a:fillRef idx="0">
-            <a:schemeClr val="dk1"/>
-          </a:fillRef>
-          <a:effectRef idx="2">
-            <a:schemeClr val="dk1"/>
-          </a:effectRef>
-          <a:fontRef idx="minor">
-            <a:schemeClr val="tx1"/>
-          </a:fontRef>
-        </p:style>
-      </p:cxnSp>
-      <p:cxnSp>
-        <p:nvCxnSpPr>
-          <p:cNvPr id="13" name="Straight Connector 12">
-            <a:extLst>
-              <a:ext uri="{FF2B5EF4-FFF2-40B4-BE49-F238E27FC236}">
-                <a16:creationId xmlns:a16="http://schemas.microsoft.com/office/drawing/2014/main" id="{D025CF52-5113-46EF-8EB6-61B77F9DEF32}"/>
-              </a:ext>
-            </a:extLst>
-          </p:cNvPr>
-          <p:cNvCxnSpPr>
-            <a:cxnSpLocks/>
-          </p:cNvCxnSpPr>
-          <p:nvPr/>
-        </p:nvCxnSpPr>
-        <p:spPr>
-          <a:xfrm>
-            <a:off x="4305905" y="5957864"/>
-            <a:ext cx="2165915" cy="0"/>
-          </a:xfrm>
-          <a:prstGeom prst="line">
-            <a:avLst/>
-          </a:prstGeom>
-        </p:spPr>
-        <p:style>
-          <a:lnRef idx="3">
-            <a:schemeClr val="dk1"/>
-          </a:lnRef>
-          <a:fillRef idx="0">
-            <a:schemeClr val="dk1"/>
-          </a:fillRef>
-          <a:effectRef idx="2">
-            <a:schemeClr val="dk1"/>
-          </a:effectRef>
-          <a:fontRef idx="minor">
-            <a:schemeClr val="tx1"/>
-          </a:fontRef>
-        </p:style>
-      </p:cxnSp>
-      <p:cxnSp>
-        <p:nvCxnSpPr>
-          <p:cNvPr id="14" name="Straight Connector 13">
-            <a:extLst>
-              <a:ext uri="{FF2B5EF4-FFF2-40B4-BE49-F238E27FC236}">
-                <a16:creationId xmlns:a16="http://schemas.microsoft.com/office/drawing/2014/main" id="{324E2CE4-0A33-4DDB-AE07-0AE69B210111}"/>
-              </a:ext>
-            </a:extLst>
-          </p:cNvPr>
-          <p:cNvCxnSpPr>
-            <a:cxnSpLocks/>
-          </p:cNvCxnSpPr>
-          <p:nvPr/>
-        </p:nvCxnSpPr>
-        <p:spPr>
-          <a:xfrm>
-            <a:off x="8328969" y="6349961"/>
-            <a:ext cx="3425066" cy="0"/>
-          </a:xfrm>
-          <a:prstGeom prst="line">
-            <a:avLst/>
-          </a:prstGeom>
-        </p:spPr>
-        <p:style>
-          <a:lnRef idx="3">
-            <a:schemeClr val="dk1"/>
-          </a:lnRef>
-          <a:fillRef idx="0">
-            <a:schemeClr val="dk1"/>
-          </a:fillRef>
-          <a:effectRef idx="2">
-            <a:schemeClr val="dk1"/>
-          </a:effectRef>
-          <a:fontRef idx="minor">
-            <a:schemeClr val="tx1"/>
-          </a:fontRef>
-        </p:style>
-      </p:cxnSp>
-      <p:cxnSp>
-        <p:nvCxnSpPr>
-          <p:cNvPr id="16" name="Straight Connector 15">
-            <a:extLst>
-              <a:ext uri="{FF2B5EF4-FFF2-40B4-BE49-F238E27FC236}">
-                <a16:creationId xmlns:a16="http://schemas.microsoft.com/office/drawing/2014/main" id="{AD59E62C-253E-4B71-BC43-506575552B4E}"/>
-              </a:ext>
-            </a:extLst>
-          </p:cNvPr>
-          <p:cNvCxnSpPr>
-            <a:cxnSpLocks/>
-          </p:cNvCxnSpPr>
-          <p:nvPr/>
-        </p:nvCxnSpPr>
-        <p:spPr>
-          <a:xfrm>
-            <a:off x="8205687" y="4194167"/>
-            <a:ext cx="3425066" cy="0"/>
-          </a:xfrm>
-          <a:prstGeom prst="line">
-            <a:avLst/>
-          </a:prstGeom>
-        </p:spPr>
-        <p:style>
-          <a:lnRef idx="3">
-            <a:schemeClr val="dk1"/>
-          </a:lnRef>
-          <a:fillRef idx="0">
-            <a:schemeClr val="dk1"/>
-          </a:fillRef>
-          <a:effectRef idx="2">
-            <a:schemeClr val="dk1"/>
+            <a:schemeClr val="accent1"/>
           </a:effectRef>
           <a:fontRef idx="minor">
             <a:schemeClr val="tx1"/>
@@ -11329,7 +12563,12 @@
             <p:ph type="title"/>
           </p:nvPr>
         </p:nvSpPr>
-        <p:spPr/>
+        <p:spPr>
+          <a:xfrm>
+            <a:off x="657224" y="499533"/>
+            <a:ext cx="10772775" cy="1103636"/>
+          </a:xfrm>
+        </p:spPr>
         <p:txBody>
           <a:bodyPr/>
           <a:lstStyle/>
@@ -11360,12 +12599,14 @@
         </p:nvSpPr>
         <p:spPr>
           <a:xfrm>
-            <a:off x="491971" y="2155039"/>
-            <a:ext cx="4301971" cy="2680758"/>
+            <a:off x="491971" y="1877758"/>
+            <a:ext cx="5030055" cy="2680758"/>
           </a:xfrm>
         </p:spPr>
         <p:txBody>
-          <a:bodyPr/>
+          <a:bodyPr>
+            <a:normAutofit lnSpcReduction="10000"/>
+          </a:bodyPr>
           <a:lstStyle/>
           <a:p>
             <a:pPr>
@@ -11373,8 +12614,8 @@
               <a:buChar char="•"/>
             </a:pPr>
             <a:r>
-              <a:rPr lang="es-GT" dirty="0"/>
-              <a:t>Eliminación de “datos nulos”</a:t>
+              <a:rPr lang="es-GT" sz="2800" dirty="0"/>
+              <a:t>  Eliminación de “datos nulos”</a:t>
             </a:r>
           </a:p>
           <a:p>
@@ -11383,8 +12624,8 @@
               <a:buChar char="•"/>
             </a:pPr>
             <a:r>
-              <a:rPr lang="es-GT" dirty="0"/>
-              <a:t>Cambio de dimensión uniforme (64,64,3)</a:t>
+              <a:rPr lang="es-GT" sz="2800" dirty="0"/>
+              <a:t>  Cambio de dimensión uniforme (64,64,3)</a:t>
             </a:r>
           </a:p>
           <a:p>
@@ -11393,8 +12634,8 @@
               <a:buChar char="•"/>
             </a:pPr>
             <a:r>
-              <a:rPr lang="es-GT" dirty="0"/>
-              <a:t>Representación RGB </a:t>
+              <a:rPr lang="es-GT" sz="2800" dirty="0"/>
+              <a:t>  Representación RGB </a:t>
             </a:r>
           </a:p>
           <a:p>
@@ -11403,22 +12644,22 @@
               <a:buChar char="•"/>
             </a:pPr>
             <a:r>
-              <a:rPr lang="es-GT" dirty="0"/>
-              <a:t>Unión de categorías </a:t>
-            </a:r>
-            <a:r>
-              <a:rPr lang="es-GT" dirty="0" err="1"/>
+              <a:rPr lang="es-GT" sz="2800" dirty="0"/>
+              <a:t>  Unión de categorías </a:t>
+            </a:r>
+            <a:r>
+              <a:rPr lang="es-GT" sz="2800" dirty="0" err="1"/>
               <a:t>Drawing</a:t>
             </a:r>
             <a:r>
-              <a:rPr lang="es-GT" dirty="0"/>
+              <a:rPr lang="es-GT" sz="2800" dirty="0"/>
               <a:t> y </a:t>
             </a:r>
             <a:r>
-              <a:rPr lang="es-GT" dirty="0" err="1"/>
+              <a:rPr lang="es-GT" sz="2800" dirty="0" err="1"/>
               <a:t>Engraving</a:t>
             </a:r>
-            <a:endParaRPr lang="es-GT" dirty="0"/>
+            <a:endParaRPr lang="es-GT" sz="2800" dirty="0"/>
           </a:p>
           <a:p>
             <a:endParaRPr lang="en-US" dirty="0"/>
@@ -11484,45 +12725,6 @@
           </a:prstGeom>
         </p:spPr>
       </p:pic>
-      <p:cxnSp>
-        <p:nvCxnSpPr>
-          <p:cNvPr id="9" name="Straight Arrow Connector 8">
-            <a:extLst>
-              <a:ext uri="{FF2B5EF4-FFF2-40B4-BE49-F238E27FC236}">
-                <a16:creationId xmlns:a16="http://schemas.microsoft.com/office/drawing/2014/main" id="{AE251FB8-9D5E-48C8-8213-73022DAC52B1}"/>
-              </a:ext>
-            </a:extLst>
-          </p:cNvPr>
-          <p:cNvCxnSpPr/>
-          <p:nvPr/>
-        </p:nvCxnSpPr>
-        <p:spPr>
-          <a:xfrm flipV="1">
-            <a:off x="4793942" y="5592932"/>
-            <a:ext cx="1056442" cy="585926"/>
-          </a:xfrm>
-          <a:prstGeom prst="straightConnector1">
-            <a:avLst/>
-          </a:prstGeom>
-          <a:ln>
-            <a:tailEnd type="triangle"/>
-          </a:ln>
-        </p:spPr>
-        <p:style>
-          <a:lnRef idx="3">
-            <a:schemeClr val="accent1"/>
-          </a:lnRef>
-          <a:fillRef idx="0">
-            <a:schemeClr val="accent1"/>
-          </a:fillRef>
-          <a:effectRef idx="2">
-            <a:schemeClr val="accent1"/>
-          </a:effectRef>
-          <a:fontRef idx="minor">
-            <a:schemeClr val="tx1"/>
-          </a:fontRef>
-        </p:style>
-      </p:cxnSp>
     </p:spTree>
     <p:extLst>
       <p:ext uri="{BB962C8B-B14F-4D97-AF65-F5344CB8AC3E}">
@@ -12475,9 +13677,10 @@
           <a:lstStyle/>
           <a:p>
             <a:r>
-              <a:rPr lang="en-US" dirty="0"/>
-              <a:t>Training and Results </a:t>
-            </a:r>
+              <a:rPr lang="en-US" dirty="0" err="1"/>
+              <a:t>Entrenamiento</a:t>
+            </a:r>
+            <a:endParaRPr lang="en-US" dirty="0"/>
           </a:p>
         </p:txBody>
       </p:sp>
@@ -13289,7 +14492,12 @@
             <p:ph type="title"/>
           </p:nvPr>
         </p:nvSpPr>
-        <p:spPr/>
+        <p:spPr>
+          <a:xfrm>
+            <a:off x="1096611" y="2599901"/>
+            <a:ext cx="3938527" cy="1658198"/>
+          </a:xfrm>
+        </p:spPr>
         <p:txBody>
           <a:bodyPr/>
           <a:lstStyle/>
@@ -13310,6 +14518,143 @@
           </a:p>
         </p:txBody>
       </p:sp>
+      <p:pic>
+        <p:nvPicPr>
+          <p:cNvPr id="3" name="Picture 2">
+            <a:extLst>
+              <a:ext uri="{FF2B5EF4-FFF2-40B4-BE49-F238E27FC236}">
+                <a16:creationId xmlns:a16="http://schemas.microsoft.com/office/drawing/2014/main" id="{0BB3D6D4-9671-4AA0-AEDE-76BD0E3E82E5}"/>
+              </a:ext>
+            </a:extLst>
+          </p:cNvPr>
+          <p:cNvPicPr>
+            <a:picLocks noChangeAspect="1"/>
+          </p:cNvPicPr>
+          <p:nvPr/>
+        </p:nvPicPr>
+        <p:blipFill>
+          <a:blip r:embed="rId2"/>
+          <a:stretch>
+            <a:fillRect/>
+          </a:stretch>
+        </p:blipFill>
+        <p:spPr>
+          <a:xfrm>
+            <a:off x="5825066" y="0"/>
+            <a:ext cx="541867" cy="6858000"/>
+          </a:xfrm>
+          <a:prstGeom prst="rect">
+            <a:avLst/>
+          </a:prstGeom>
+        </p:spPr>
+      </p:pic>
+      <p:pic>
+        <p:nvPicPr>
+          <p:cNvPr id="4" name="Picture 3">
+            <a:extLst>
+              <a:ext uri="{FF2B5EF4-FFF2-40B4-BE49-F238E27FC236}">
+                <a16:creationId xmlns:a16="http://schemas.microsoft.com/office/drawing/2014/main" id="{51667B53-5117-419C-8584-0E0FCC084F86}"/>
+              </a:ext>
+            </a:extLst>
+          </p:cNvPr>
+          <p:cNvPicPr>
+            <a:picLocks noChangeAspect="1"/>
+          </p:cNvPicPr>
+          <p:nvPr/>
+        </p:nvPicPr>
+        <p:blipFill>
+          <a:blip r:embed="rId3"/>
+          <a:stretch>
+            <a:fillRect/>
+          </a:stretch>
+        </p:blipFill>
+        <p:spPr>
+          <a:xfrm>
+            <a:off x="6366933" y="0"/>
+            <a:ext cx="610354" cy="6858000"/>
+          </a:xfrm>
+          <a:prstGeom prst="rect">
+            <a:avLst/>
+          </a:prstGeom>
+        </p:spPr>
+      </p:pic>
+      <p:pic>
+        <p:nvPicPr>
+          <p:cNvPr id="5" name="Picture 4">
+            <a:extLst>
+              <a:ext uri="{FF2B5EF4-FFF2-40B4-BE49-F238E27FC236}">
+                <a16:creationId xmlns:a16="http://schemas.microsoft.com/office/drawing/2014/main" id="{54FA2BE7-180E-485A-BADD-674D0B35DBA3}"/>
+              </a:ext>
+            </a:extLst>
+          </p:cNvPr>
+          <p:cNvPicPr>
+            <a:picLocks noChangeAspect="1"/>
+          </p:cNvPicPr>
+          <p:nvPr/>
+        </p:nvPicPr>
+        <p:blipFill>
+          <a:blip r:embed="rId4"/>
+          <a:stretch>
+            <a:fillRect/>
+          </a:stretch>
+        </p:blipFill>
+        <p:spPr>
+          <a:xfrm>
+            <a:off x="6992269" y="0"/>
+            <a:ext cx="526885" cy="6858000"/>
+          </a:xfrm>
+          <a:prstGeom prst="rect">
+            <a:avLst/>
+          </a:prstGeom>
+        </p:spPr>
+      </p:pic>
+      <p:pic>
+        <p:nvPicPr>
+          <p:cNvPr id="2050" name="Picture 2">
+            <a:extLst>
+              <a:ext uri="{FF2B5EF4-FFF2-40B4-BE49-F238E27FC236}">
+                <a16:creationId xmlns:a16="http://schemas.microsoft.com/office/drawing/2014/main" id="{4954585D-7096-4424-9065-133F108696CF}"/>
+              </a:ext>
+            </a:extLst>
+          </p:cNvPr>
+          <p:cNvPicPr>
+            <a:picLocks noChangeAspect="1" noChangeArrowheads="1"/>
+          </p:cNvPicPr>
+          <p:nvPr/>
+        </p:nvPicPr>
+        <p:blipFill>
+          <a:blip r:embed="rId5">
+            <a:extLst>
+              <a:ext uri="{28A0092B-C50C-407E-A947-70E740481C1C}">
+                <a14:useLocalDpi xmlns:a14="http://schemas.microsoft.com/office/drawing/2010/main" val="0"/>
+              </a:ext>
+            </a:extLst>
+          </a:blip>
+          <a:srcRect/>
+          <a:stretch>
+            <a:fillRect/>
+          </a:stretch>
+        </p:blipFill>
+        <p:spPr bwMode="auto">
+          <a:xfrm>
+            <a:off x="8063344" y="2366735"/>
+            <a:ext cx="3823855" cy="2124530"/>
+          </a:xfrm>
+          <a:prstGeom prst="rect">
+            <a:avLst/>
+          </a:prstGeom>
+          <a:noFill/>
+          <a:extLst>
+            <a:ext uri="{909E8E84-426E-40DD-AFC4-6F175D3DCCD1}">
+              <a14:hiddenFill xmlns:a14="http://schemas.microsoft.com/office/drawing/2010/main">
+                <a:solidFill>
+                  <a:srgbClr val="FFFFFF"/>
+                </a:solidFill>
+              </a14:hiddenFill>
+            </a:ext>
+          </a:extLst>
+        </p:spPr>
+      </p:pic>
     </p:spTree>
     <p:extLst>
       <p:ext uri="{BB962C8B-B14F-4D97-AF65-F5344CB8AC3E}">

</xml_diff>